<commit_message>
week 05: remove initializers
</commit_message>
<xml_diff>
--- a/week_05/week_05.pptx
+++ b/week_05/week_05.pptx
@@ -4,6 +4,9 @@
   <p:sldMasterIdLst>
     <p:sldMasterId id="2147483840" r:id="rId1"/>
   </p:sldMasterIdLst>
+  <p:notesMasterIdLst>
+    <p:notesMasterId r:id="rId17"/>
+  </p:notesMasterIdLst>
   <p:sldIdLst>
     <p:sldId id="256" r:id="rId2"/>
     <p:sldId id="258" r:id="rId3"/>
@@ -17,10 +20,9 @@
     <p:sldId id="291" r:id="rId11"/>
     <p:sldId id="292" r:id="rId12"/>
     <p:sldId id="293" r:id="rId13"/>
-    <p:sldId id="294" r:id="rId14"/>
-    <p:sldId id="278" r:id="rId15"/>
-    <p:sldId id="259" r:id="rId16"/>
-    <p:sldId id="273" r:id="rId17"/>
+    <p:sldId id="278" r:id="rId14"/>
+    <p:sldId id="259" r:id="rId15"/>
+    <p:sldId id="273" r:id="rId16"/>
   </p:sldIdLst>
   <p:sldSz cx="12192000" cy="6858000"/>
   <p:notesSz cx="6858000" cy="9144000"/>
@@ -127,6 +129,355 @@
 </p:presentation>
 </file>
 
+<file path=ppt/notesMasters/notesMaster1.xml><?xml version="1.0" encoding="utf-8"?>
+<p:notesMaster xmlns:a="http://schemas.openxmlformats.org/drawingml/2006/main" xmlns:r="http://schemas.openxmlformats.org/officeDocument/2006/relationships" xmlns:p="http://schemas.openxmlformats.org/presentationml/2006/main">
+  <p:cSld>
+    <p:bg>
+      <p:bgRef idx="1001">
+        <a:schemeClr val="bg1"/>
+      </p:bgRef>
+    </p:bg>
+    <p:spTree>
+      <p:nvGrpSpPr>
+        <p:cNvPr id="1" name=""/>
+        <p:cNvGrpSpPr/>
+        <p:nvPr/>
+      </p:nvGrpSpPr>
+      <p:grpSpPr>
+        <a:xfrm>
+          <a:off x="0" y="0"/>
+          <a:ext cx="0" cy="0"/>
+          <a:chOff x="0" y="0"/>
+          <a:chExt cx="0" cy="0"/>
+        </a:xfrm>
+      </p:grpSpPr>
+      <p:sp>
+        <p:nvSpPr>
+          <p:cNvPr id="2" name="Header Placeholder 1"/>
+          <p:cNvSpPr>
+            <a:spLocks noGrp="1"/>
+          </p:cNvSpPr>
+          <p:nvPr>
+            <p:ph type="hdr" sz="quarter"/>
+          </p:nvPr>
+        </p:nvSpPr>
+        <p:spPr>
+          <a:xfrm>
+            <a:off x="0" y="0"/>
+            <a:ext cx="2971800" cy="458788"/>
+          </a:xfrm>
+          <a:prstGeom prst="rect">
+            <a:avLst/>
+          </a:prstGeom>
+        </p:spPr>
+        <p:txBody>
+          <a:bodyPr vert="horz" lIns="91440" tIns="45720" rIns="91440" bIns="45720" rtlCol="0"/>
+          <a:lstStyle>
+            <a:lvl1pPr algn="l">
+              <a:defRPr sz="1200"/>
+            </a:lvl1pPr>
+          </a:lstStyle>
+          <a:p>
+            <a:endParaRPr lang="en-US"/>
+          </a:p>
+        </p:txBody>
+      </p:sp>
+      <p:sp>
+        <p:nvSpPr>
+          <p:cNvPr id="3" name="Date Placeholder 2"/>
+          <p:cNvSpPr>
+            <a:spLocks noGrp="1"/>
+          </p:cNvSpPr>
+          <p:nvPr>
+            <p:ph type="dt" idx="1"/>
+          </p:nvPr>
+        </p:nvSpPr>
+        <p:spPr>
+          <a:xfrm>
+            <a:off x="3884613" y="0"/>
+            <a:ext cx="2971800" cy="458788"/>
+          </a:xfrm>
+          <a:prstGeom prst="rect">
+            <a:avLst/>
+          </a:prstGeom>
+        </p:spPr>
+        <p:txBody>
+          <a:bodyPr vert="horz" lIns="91440" tIns="45720" rIns="91440" bIns="45720" rtlCol="0"/>
+          <a:lstStyle>
+            <a:lvl1pPr algn="r">
+              <a:defRPr sz="1200"/>
+            </a:lvl1pPr>
+          </a:lstStyle>
+          <a:p>
+            <a:fld id="{D098A69A-8C0A-417B-A4F9-F3F8CFDA4B25}" type="datetimeFigureOut">
+              <a:rPr lang="en-US" smtClean="0"/>
+              <a:t>9/26/2016</a:t>
+            </a:fld>
+            <a:endParaRPr lang="en-US"/>
+          </a:p>
+        </p:txBody>
+      </p:sp>
+      <p:sp>
+        <p:nvSpPr>
+          <p:cNvPr id="4" name="Slide Image Placeholder 3"/>
+          <p:cNvSpPr>
+            <a:spLocks noGrp="1" noRot="1" noChangeAspect="1"/>
+          </p:cNvSpPr>
+          <p:nvPr>
+            <p:ph type="sldImg" idx="2"/>
+          </p:nvPr>
+        </p:nvSpPr>
+        <p:spPr>
+          <a:xfrm>
+            <a:off x="685800" y="1143000"/>
+            <a:ext cx="5486400" cy="3086100"/>
+          </a:xfrm>
+          <a:prstGeom prst="rect">
+            <a:avLst/>
+          </a:prstGeom>
+          <a:noFill/>
+          <a:ln w="12700">
+            <a:solidFill>
+              <a:prstClr val="black"/>
+            </a:solidFill>
+          </a:ln>
+        </p:spPr>
+        <p:txBody>
+          <a:bodyPr vert="horz" lIns="91440" tIns="45720" rIns="91440" bIns="45720" rtlCol="0" anchor="ctr"/>
+          <a:lstStyle/>
+          <a:p>
+            <a:endParaRPr lang="en-US"/>
+          </a:p>
+        </p:txBody>
+      </p:sp>
+      <p:sp>
+        <p:nvSpPr>
+          <p:cNvPr id="5" name="Notes Placeholder 4"/>
+          <p:cNvSpPr>
+            <a:spLocks noGrp="1"/>
+          </p:cNvSpPr>
+          <p:nvPr>
+            <p:ph type="body" sz="quarter" idx="3"/>
+          </p:nvPr>
+        </p:nvSpPr>
+        <p:spPr>
+          <a:xfrm>
+            <a:off x="685800" y="4400550"/>
+            <a:ext cx="5486400" cy="3600450"/>
+          </a:xfrm>
+          <a:prstGeom prst="rect">
+            <a:avLst/>
+          </a:prstGeom>
+        </p:spPr>
+        <p:txBody>
+          <a:bodyPr vert="horz" lIns="91440" tIns="45720" rIns="91440" bIns="45720" rtlCol="0"/>
+          <a:lstStyle/>
+          <a:p>
+            <a:pPr lvl="0"/>
+            <a:r>
+              <a:rPr lang="en-US"/>
+              <a:t>Edit Master text styles</a:t>
+            </a:r>
+          </a:p>
+          <a:p>
+            <a:pPr lvl="1"/>
+            <a:r>
+              <a:rPr lang="en-US"/>
+              <a:t>Second level</a:t>
+            </a:r>
+          </a:p>
+          <a:p>
+            <a:pPr lvl="2"/>
+            <a:r>
+              <a:rPr lang="en-US"/>
+              <a:t>Third level</a:t>
+            </a:r>
+          </a:p>
+          <a:p>
+            <a:pPr lvl="3"/>
+            <a:r>
+              <a:rPr lang="en-US"/>
+              <a:t>Fourth level</a:t>
+            </a:r>
+          </a:p>
+          <a:p>
+            <a:pPr lvl="4"/>
+            <a:r>
+              <a:rPr lang="en-US"/>
+              <a:t>Fifth level</a:t>
+            </a:r>
+          </a:p>
+        </p:txBody>
+      </p:sp>
+      <p:sp>
+        <p:nvSpPr>
+          <p:cNvPr id="6" name="Footer Placeholder 5"/>
+          <p:cNvSpPr>
+            <a:spLocks noGrp="1"/>
+          </p:cNvSpPr>
+          <p:nvPr>
+            <p:ph type="ftr" sz="quarter" idx="4"/>
+          </p:nvPr>
+        </p:nvSpPr>
+        <p:spPr>
+          <a:xfrm>
+            <a:off x="0" y="8685213"/>
+            <a:ext cx="2971800" cy="458787"/>
+          </a:xfrm>
+          <a:prstGeom prst="rect">
+            <a:avLst/>
+          </a:prstGeom>
+        </p:spPr>
+        <p:txBody>
+          <a:bodyPr vert="horz" lIns="91440" tIns="45720" rIns="91440" bIns="45720" rtlCol="0" anchor="b"/>
+          <a:lstStyle>
+            <a:lvl1pPr algn="l">
+              <a:defRPr sz="1200"/>
+            </a:lvl1pPr>
+          </a:lstStyle>
+          <a:p>
+            <a:endParaRPr lang="en-US"/>
+          </a:p>
+        </p:txBody>
+      </p:sp>
+      <p:sp>
+        <p:nvSpPr>
+          <p:cNvPr id="7" name="Slide Number Placeholder 6"/>
+          <p:cNvSpPr>
+            <a:spLocks noGrp="1"/>
+          </p:cNvSpPr>
+          <p:nvPr>
+            <p:ph type="sldNum" sz="quarter" idx="5"/>
+          </p:nvPr>
+        </p:nvSpPr>
+        <p:spPr>
+          <a:xfrm>
+            <a:off x="3884613" y="8685213"/>
+            <a:ext cx="2971800" cy="458787"/>
+          </a:xfrm>
+          <a:prstGeom prst="rect">
+            <a:avLst/>
+          </a:prstGeom>
+        </p:spPr>
+        <p:txBody>
+          <a:bodyPr vert="horz" lIns="91440" tIns="45720" rIns="91440" bIns="45720" rtlCol="0" anchor="b"/>
+          <a:lstStyle>
+            <a:lvl1pPr algn="r">
+              <a:defRPr sz="1200"/>
+            </a:lvl1pPr>
+          </a:lstStyle>
+          <a:p>
+            <a:fld id="{40D03906-7026-40BE-821C-078365C3E8B9}" type="slidenum">
+              <a:rPr lang="en-US" smtClean="0"/>
+              <a:t>‹#›</a:t>
+            </a:fld>
+            <a:endParaRPr lang="en-US"/>
+          </a:p>
+        </p:txBody>
+      </p:sp>
+    </p:spTree>
+    <p:extLst>
+      <p:ext uri="{BB962C8B-B14F-4D97-AF65-F5344CB8AC3E}">
+        <p14:creationId xmlns:p14="http://schemas.microsoft.com/office/powerpoint/2010/main" val="3004966494"/>
+      </p:ext>
+    </p:extLst>
+  </p:cSld>
+  <p:clrMap bg1="lt1" tx1="dk1" bg2="lt2" tx2="dk2" accent1="accent1" accent2="accent2" accent3="accent3" accent4="accent4" accent5="accent5" accent6="accent6" hlink="hlink" folHlink="folHlink"/>
+  <p:notesStyle>
+    <a:lvl1pPr marL="0" algn="l" defTabSz="914400" rtl="0" eaLnBrk="1" latinLnBrk="0" hangingPunct="1">
+      <a:defRPr sz="1200" kern="1200">
+        <a:solidFill>
+          <a:schemeClr val="tx1"/>
+        </a:solidFill>
+        <a:latin typeface="+mn-lt"/>
+        <a:ea typeface="+mn-ea"/>
+        <a:cs typeface="+mn-cs"/>
+      </a:defRPr>
+    </a:lvl1pPr>
+    <a:lvl2pPr marL="457200" algn="l" defTabSz="914400" rtl="0" eaLnBrk="1" latinLnBrk="0" hangingPunct="1">
+      <a:defRPr sz="1200" kern="1200">
+        <a:solidFill>
+          <a:schemeClr val="tx1"/>
+        </a:solidFill>
+        <a:latin typeface="+mn-lt"/>
+        <a:ea typeface="+mn-ea"/>
+        <a:cs typeface="+mn-cs"/>
+      </a:defRPr>
+    </a:lvl2pPr>
+    <a:lvl3pPr marL="914400" algn="l" defTabSz="914400" rtl="0" eaLnBrk="1" latinLnBrk="0" hangingPunct="1">
+      <a:defRPr sz="1200" kern="1200">
+        <a:solidFill>
+          <a:schemeClr val="tx1"/>
+        </a:solidFill>
+        <a:latin typeface="+mn-lt"/>
+        <a:ea typeface="+mn-ea"/>
+        <a:cs typeface="+mn-cs"/>
+      </a:defRPr>
+    </a:lvl3pPr>
+    <a:lvl4pPr marL="1371600" algn="l" defTabSz="914400" rtl="0" eaLnBrk="1" latinLnBrk="0" hangingPunct="1">
+      <a:defRPr sz="1200" kern="1200">
+        <a:solidFill>
+          <a:schemeClr val="tx1"/>
+        </a:solidFill>
+        <a:latin typeface="+mn-lt"/>
+        <a:ea typeface="+mn-ea"/>
+        <a:cs typeface="+mn-cs"/>
+      </a:defRPr>
+    </a:lvl4pPr>
+    <a:lvl5pPr marL="1828800" algn="l" defTabSz="914400" rtl="0" eaLnBrk="1" latinLnBrk="0" hangingPunct="1">
+      <a:defRPr sz="1200" kern="1200">
+        <a:solidFill>
+          <a:schemeClr val="tx1"/>
+        </a:solidFill>
+        <a:latin typeface="+mn-lt"/>
+        <a:ea typeface="+mn-ea"/>
+        <a:cs typeface="+mn-cs"/>
+      </a:defRPr>
+    </a:lvl5pPr>
+    <a:lvl6pPr marL="2286000" algn="l" defTabSz="914400" rtl="0" eaLnBrk="1" latinLnBrk="0" hangingPunct="1">
+      <a:defRPr sz="1200" kern="1200">
+        <a:solidFill>
+          <a:schemeClr val="tx1"/>
+        </a:solidFill>
+        <a:latin typeface="+mn-lt"/>
+        <a:ea typeface="+mn-ea"/>
+        <a:cs typeface="+mn-cs"/>
+      </a:defRPr>
+    </a:lvl6pPr>
+    <a:lvl7pPr marL="2743200" algn="l" defTabSz="914400" rtl="0" eaLnBrk="1" latinLnBrk="0" hangingPunct="1">
+      <a:defRPr sz="1200" kern="1200">
+        <a:solidFill>
+          <a:schemeClr val="tx1"/>
+        </a:solidFill>
+        <a:latin typeface="+mn-lt"/>
+        <a:ea typeface="+mn-ea"/>
+        <a:cs typeface="+mn-cs"/>
+      </a:defRPr>
+    </a:lvl7pPr>
+    <a:lvl8pPr marL="3200400" algn="l" defTabSz="914400" rtl="0" eaLnBrk="1" latinLnBrk="0" hangingPunct="1">
+      <a:defRPr sz="1200" kern="1200">
+        <a:solidFill>
+          <a:schemeClr val="tx1"/>
+        </a:solidFill>
+        <a:latin typeface="+mn-lt"/>
+        <a:ea typeface="+mn-ea"/>
+        <a:cs typeface="+mn-cs"/>
+      </a:defRPr>
+    </a:lvl8pPr>
+    <a:lvl9pPr marL="3657600" algn="l" defTabSz="914400" rtl="0" eaLnBrk="1" latinLnBrk="0" hangingPunct="1">
+      <a:defRPr sz="1200" kern="1200">
+        <a:solidFill>
+          <a:schemeClr val="tx1"/>
+        </a:solidFill>
+        <a:latin typeface="+mn-lt"/>
+        <a:ea typeface="+mn-ea"/>
+        <a:cs typeface="+mn-cs"/>
+      </a:defRPr>
+    </a:lvl9pPr>
+  </p:notesStyle>
+</p:notesMaster>
+</file>
+
 <file path=ppt/slideLayouts/slideLayout1.xml><?xml version="1.0" encoding="utf-8"?>
 <p:sldLayout xmlns:a="http://schemas.openxmlformats.org/drawingml/2006/main" xmlns:r="http://schemas.openxmlformats.org/officeDocument/2006/relationships" xmlns:p="http://schemas.openxmlformats.org/presentationml/2006/main" showMasterSp="0" type="title" preserve="1">
   <p:cSld name="Title Slide">
@@ -188,7 +539,7 @@
           </a:lstStyle>
           <a:p>
             <a:r>
-              <a:rPr lang="en-US" smtClean="0"/>
+              <a:rPr lang="en-US"/>
               <a:t>Click to edit Master title style</a:t>
             </a:r>
             <a:endParaRPr lang="en-US" dirty="0"/>
@@ -261,7 +612,7 @@
           </a:lstStyle>
           <a:p>
             <a:r>
-              <a:rPr lang="en-US" smtClean="0"/>
+              <a:rPr lang="en-US"/>
               <a:t>Click to edit Master subtitle style</a:t>
             </a:r>
             <a:endParaRPr lang="en-US" dirty="0"/>
@@ -293,9 +644,9 @@
             </a:lvl1pPr>
           </a:lstStyle>
           <a:p>
-            <a:fld id="{9E016143-E03C-4CFD-AFDC-14E5BDEA754C}" type="datetimeFigureOut">
-              <a:rPr lang="en-US" dirty="0"/>
-              <a:t>2/17/16</a:t>
+            <a:fld id="{C5022D4C-ECF1-4363-AE2D-FF2CC7668413}" type="datetime1">
+              <a:rPr lang="en-US" smtClean="0"/>
+              <a:t>9/26/2016</a:t>
             </a:fld>
             <a:endParaRPr lang="en-US" dirty="0"/>
           </a:p>
@@ -443,83 +794,83 @@
           <a:lstStyle/>
           <a:p>
             <a:r>
+              <a:rPr lang="en-US"/>
+              <a:t>Click to edit Master title style</a:t>
+            </a:r>
+            <a:endParaRPr lang="en-US" dirty="0"/>
+          </a:p>
+        </p:txBody>
+      </p:sp>
+      <p:sp>
+        <p:nvSpPr>
+          <p:cNvPr id="3" name="Vertical Text Placeholder 2"/>
+          <p:cNvSpPr>
+            <a:spLocks noGrp="1"/>
+          </p:cNvSpPr>
+          <p:nvPr>
+            <p:ph type="body" orient="vert" idx="1"/>
+          </p:nvPr>
+        </p:nvSpPr>
+        <p:spPr/>
+        <p:txBody>
+          <a:bodyPr vert="eaVert"/>
+          <a:lstStyle/>
+          <a:p>
+            <a:pPr lvl="0"/>
+            <a:r>
+              <a:rPr lang="en-US"/>
+              <a:t>Click to edit Master text styles</a:t>
+            </a:r>
+          </a:p>
+          <a:p>
+            <a:pPr lvl="1"/>
+            <a:r>
+              <a:rPr lang="en-US"/>
+              <a:t>Second level</a:t>
+            </a:r>
+          </a:p>
+          <a:p>
+            <a:pPr lvl="2"/>
+            <a:r>
+              <a:rPr lang="en-US"/>
+              <a:t>Third level</a:t>
+            </a:r>
+          </a:p>
+          <a:p>
+            <a:pPr lvl="3"/>
+            <a:r>
+              <a:rPr lang="en-US"/>
+              <a:t>Fourth level</a:t>
+            </a:r>
+          </a:p>
+          <a:p>
+            <a:pPr lvl="4"/>
+            <a:r>
+              <a:rPr lang="en-US"/>
+              <a:t>Fifth level</a:t>
+            </a:r>
+            <a:endParaRPr lang="en-US" dirty="0"/>
+          </a:p>
+        </p:txBody>
+      </p:sp>
+      <p:sp>
+        <p:nvSpPr>
+          <p:cNvPr id="4" name="Date Placeholder 3"/>
+          <p:cNvSpPr>
+            <a:spLocks noGrp="1"/>
+          </p:cNvSpPr>
+          <p:nvPr>
+            <p:ph type="dt" sz="half" idx="10"/>
+          </p:nvPr>
+        </p:nvSpPr>
+        <p:spPr/>
+        <p:txBody>
+          <a:bodyPr/>
+          <a:lstStyle/>
+          <a:p>
+            <a:fld id="{FD466F08-1A84-4361-A42C-F8F461839910}" type="datetime1">
               <a:rPr lang="en-US" smtClean="0"/>
-              <a:t>Click to edit Master title style</a:t>
-            </a:r>
-            <a:endParaRPr lang="en-US" dirty="0"/>
-          </a:p>
-        </p:txBody>
-      </p:sp>
-      <p:sp>
-        <p:nvSpPr>
-          <p:cNvPr id="3" name="Vertical Text Placeholder 2"/>
-          <p:cNvSpPr>
-            <a:spLocks noGrp="1"/>
-          </p:cNvSpPr>
-          <p:nvPr>
-            <p:ph type="body" orient="vert" idx="1"/>
-          </p:nvPr>
-        </p:nvSpPr>
-        <p:spPr/>
-        <p:txBody>
-          <a:bodyPr vert="eaVert"/>
-          <a:lstStyle/>
-          <a:p>
-            <a:pPr lvl="0"/>
-            <a:r>
-              <a:rPr lang="en-US" smtClean="0"/>
-              <a:t>Click to edit Master text styles</a:t>
-            </a:r>
-          </a:p>
-          <a:p>
-            <a:pPr lvl="1"/>
-            <a:r>
-              <a:rPr lang="en-US" smtClean="0"/>
-              <a:t>Second level</a:t>
-            </a:r>
-          </a:p>
-          <a:p>
-            <a:pPr lvl="2"/>
-            <a:r>
-              <a:rPr lang="en-US" smtClean="0"/>
-              <a:t>Third level</a:t>
-            </a:r>
-          </a:p>
-          <a:p>
-            <a:pPr lvl="3"/>
-            <a:r>
-              <a:rPr lang="en-US" smtClean="0"/>
-              <a:t>Fourth level</a:t>
-            </a:r>
-          </a:p>
-          <a:p>
-            <a:pPr lvl="4"/>
-            <a:r>
-              <a:rPr lang="en-US" smtClean="0"/>
-              <a:t>Fifth level</a:t>
-            </a:r>
-            <a:endParaRPr lang="en-US" dirty="0"/>
-          </a:p>
-        </p:txBody>
-      </p:sp>
-      <p:sp>
-        <p:nvSpPr>
-          <p:cNvPr id="4" name="Date Placeholder 3"/>
-          <p:cNvSpPr>
-            <a:spLocks noGrp="1"/>
-          </p:cNvSpPr>
-          <p:nvPr>
-            <p:ph type="dt" sz="half" idx="10"/>
-          </p:nvPr>
-        </p:nvSpPr>
-        <p:spPr/>
-        <p:txBody>
-          <a:bodyPr/>
-          <a:lstStyle/>
-          <a:p>
-            <a:fld id="{C033E54A-A8CA-48C1-9504-691B58049D29}" type="datetimeFigureOut">
-              <a:rPr lang="en-US" dirty="0"/>
-              <a:t>2/17/16</a:t>
+              <a:t>9/26/2016</a:t>
             </a:fld>
             <a:endParaRPr lang="en-US" dirty="0"/>
           </a:p>
@@ -613,7 +964,7 @@
           <a:lstStyle/>
           <a:p>
             <a:r>
-              <a:rPr lang="en-US" smtClean="0"/>
+              <a:rPr lang="en-US"/>
               <a:t>Click to edit Master title style</a:t>
             </a:r>
             <a:endParaRPr lang="en-US" dirty="0"/>
@@ -642,59 +993,59 @@
           <a:p>
             <a:pPr lvl="0"/>
             <a:r>
+              <a:rPr lang="en-US"/>
+              <a:t>Click to edit Master text styles</a:t>
+            </a:r>
+          </a:p>
+          <a:p>
+            <a:pPr lvl="1"/>
+            <a:r>
+              <a:rPr lang="en-US"/>
+              <a:t>Second level</a:t>
+            </a:r>
+          </a:p>
+          <a:p>
+            <a:pPr lvl="2"/>
+            <a:r>
+              <a:rPr lang="en-US"/>
+              <a:t>Third level</a:t>
+            </a:r>
+          </a:p>
+          <a:p>
+            <a:pPr lvl="3"/>
+            <a:r>
+              <a:rPr lang="en-US"/>
+              <a:t>Fourth level</a:t>
+            </a:r>
+          </a:p>
+          <a:p>
+            <a:pPr lvl="4"/>
+            <a:r>
+              <a:rPr lang="en-US"/>
+              <a:t>Fifth level</a:t>
+            </a:r>
+            <a:endParaRPr lang="en-US" dirty="0"/>
+          </a:p>
+        </p:txBody>
+      </p:sp>
+      <p:sp>
+        <p:nvSpPr>
+          <p:cNvPr id="4" name="Date Placeholder 3"/>
+          <p:cNvSpPr>
+            <a:spLocks noGrp="1"/>
+          </p:cNvSpPr>
+          <p:nvPr>
+            <p:ph type="dt" sz="half" idx="10"/>
+          </p:nvPr>
+        </p:nvSpPr>
+        <p:spPr/>
+        <p:txBody>
+          <a:bodyPr/>
+          <a:lstStyle/>
+          <a:p>
+            <a:fld id="{164C6F1A-3BA3-49D0-8A1C-AC2B4AEA557B}" type="datetime1">
               <a:rPr lang="en-US" smtClean="0"/>
-              <a:t>Click to edit Master text styles</a:t>
-            </a:r>
-          </a:p>
-          <a:p>
-            <a:pPr lvl="1"/>
-            <a:r>
-              <a:rPr lang="en-US" smtClean="0"/>
-              <a:t>Second level</a:t>
-            </a:r>
-          </a:p>
-          <a:p>
-            <a:pPr lvl="2"/>
-            <a:r>
-              <a:rPr lang="en-US" smtClean="0"/>
-              <a:t>Third level</a:t>
-            </a:r>
-          </a:p>
-          <a:p>
-            <a:pPr lvl="3"/>
-            <a:r>
-              <a:rPr lang="en-US" smtClean="0"/>
-              <a:t>Fourth level</a:t>
-            </a:r>
-          </a:p>
-          <a:p>
-            <a:pPr lvl="4"/>
-            <a:r>
-              <a:rPr lang="en-US" smtClean="0"/>
-              <a:t>Fifth level</a:t>
-            </a:r>
-            <a:endParaRPr lang="en-US" dirty="0"/>
-          </a:p>
-        </p:txBody>
-      </p:sp>
-      <p:sp>
-        <p:nvSpPr>
-          <p:cNvPr id="4" name="Date Placeholder 3"/>
-          <p:cNvSpPr>
-            <a:spLocks noGrp="1"/>
-          </p:cNvSpPr>
-          <p:nvPr>
-            <p:ph type="dt" sz="half" idx="10"/>
-          </p:nvPr>
-        </p:nvSpPr>
-        <p:spPr/>
-        <p:txBody>
-          <a:bodyPr/>
-          <a:lstStyle/>
-          <a:p>
-            <a:fld id="{B5F6C806-BBF7-471C-9527-881CE2266695}" type="datetimeFigureOut">
-              <a:rPr lang="en-US" dirty="0"/>
-              <a:t>2/17/16</a:t>
+              <a:t>9/26/2016</a:t>
             </a:fld>
             <a:endParaRPr lang="en-US" dirty="0"/>
           </a:p>
@@ -783,83 +1134,83 @@
           <a:lstStyle/>
           <a:p>
             <a:r>
+              <a:rPr lang="en-US"/>
+              <a:t>Click to edit Master title style</a:t>
+            </a:r>
+            <a:endParaRPr lang="en-US" dirty="0"/>
+          </a:p>
+        </p:txBody>
+      </p:sp>
+      <p:sp>
+        <p:nvSpPr>
+          <p:cNvPr id="3" name="Content Placeholder 2"/>
+          <p:cNvSpPr>
+            <a:spLocks noGrp="1"/>
+          </p:cNvSpPr>
+          <p:nvPr>
+            <p:ph idx="1"/>
+          </p:nvPr>
+        </p:nvSpPr>
+        <p:spPr/>
+        <p:txBody>
+          <a:bodyPr/>
+          <a:lstStyle/>
+          <a:p>
+            <a:pPr lvl="0"/>
+            <a:r>
+              <a:rPr lang="en-US"/>
+              <a:t>Click to edit Master text styles</a:t>
+            </a:r>
+          </a:p>
+          <a:p>
+            <a:pPr lvl="1"/>
+            <a:r>
+              <a:rPr lang="en-US"/>
+              <a:t>Second level</a:t>
+            </a:r>
+          </a:p>
+          <a:p>
+            <a:pPr lvl="2"/>
+            <a:r>
+              <a:rPr lang="en-US"/>
+              <a:t>Third level</a:t>
+            </a:r>
+          </a:p>
+          <a:p>
+            <a:pPr lvl="3"/>
+            <a:r>
+              <a:rPr lang="en-US"/>
+              <a:t>Fourth level</a:t>
+            </a:r>
+          </a:p>
+          <a:p>
+            <a:pPr lvl="4"/>
+            <a:r>
+              <a:rPr lang="en-US"/>
+              <a:t>Fifth level</a:t>
+            </a:r>
+            <a:endParaRPr lang="en-US" dirty="0"/>
+          </a:p>
+        </p:txBody>
+      </p:sp>
+      <p:sp>
+        <p:nvSpPr>
+          <p:cNvPr id="4" name="Date Placeholder 3"/>
+          <p:cNvSpPr>
+            <a:spLocks noGrp="1"/>
+          </p:cNvSpPr>
+          <p:nvPr>
+            <p:ph type="dt" sz="half" idx="10"/>
+          </p:nvPr>
+        </p:nvSpPr>
+        <p:spPr/>
+        <p:txBody>
+          <a:bodyPr/>
+          <a:lstStyle/>
+          <a:p>
+            <a:fld id="{7AA2696C-B353-4BBB-A6A0-AB25442AAAE1}" type="datetime1">
               <a:rPr lang="en-US" smtClean="0"/>
-              <a:t>Click to edit Master title style</a:t>
-            </a:r>
-            <a:endParaRPr lang="en-US" dirty="0"/>
-          </a:p>
-        </p:txBody>
-      </p:sp>
-      <p:sp>
-        <p:nvSpPr>
-          <p:cNvPr id="3" name="Content Placeholder 2"/>
-          <p:cNvSpPr>
-            <a:spLocks noGrp="1"/>
-          </p:cNvSpPr>
-          <p:nvPr>
-            <p:ph idx="1"/>
-          </p:nvPr>
-        </p:nvSpPr>
-        <p:spPr/>
-        <p:txBody>
-          <a:bodyPr/>
-          <a:lstStyle/>
-          <a:p>
-            <a:pPr lvl="0"/>
-            <a:r>
-              <a:rPr lang="en-US" smtClean="0"/>
-              <a:t>Click to edit Master text styles</a:t>
-            </a:r>
-          </a:p>
-          <a:p>
-            <a:pPr lvl="1"/>
-            <a:r>
-              <a:rPr lang="en-US" smtClean="0"/>
-              <a:t>Second level</a:t>
-            </a:r>
-          </a:p>
-          <a:p>
-            <a:pPr lvl="2"/>
-            <a:r>
-              <a:rPr lang="en-US" smtClean="0"/>
-              <a:t>Third level</a:t>
-            </a:r>
-          </a:p>
-          <a:p>
-            <a:pPr lvl="3"/>
-            <a:r>
-              <a:rPr lang="en-US" smtClean="0"/>
-              <a:t>Fourth level</a:t>
-            </a:r>
-          </a:p>
-          <a:p>
-            <a:pPr lvl="4"/>
-            <a:r>
-              <a:rPr lang="en-US" smtClean="0"/>
-              <a:t>Fifth level</a:t>
-            </a:r>
-            <a:endParaRPr lang="en-US" dirty="0"/>
-          </a:p>
-        </p:txBody>
-      </p:sp>
-      <p:sp>
-        <p:nvSpPr>
-          <p:cNvPr id="4" name="Date Placeholder 3"/>
-          <p:cNvSpPr>
-            <a:spLocks noGrp="1"/>
-          </p:cNvSpPr>
-          <p:nvPr>
-            <p:ph type="dt" sz="half" idx="10"/>
-          </p:nvPr>
-        </p:nvSpPr>
-        <p:spPr/>
-        <p:txBody>
-          <a:bodyPr/>
-          <a:lstStyle/>
-          <a:p>
-            <a:fld id="{78C94063-DF36-4330-A365-08DA1FA5B7D6}" type="datetimeFigureOut">
-              <a:rPr lang="en-US" dirty="0"/>
-              <a:t>2/17/16</a:t>
+              <a:t>9/26/2016</a:t>
             </a:fld>
             <a:endParaRPr lang="en-US" dirty="0"/>
           </a:p>
@@ -962,7 +1313,7 @@
           </a:lstStyle>
           <a:p>
             <a:r>
-              <a:rPr lang="en-US" smtClean="0"/>
+              <a:rPr lang="en-US"/>
               <a:t>Click to edit Master title style</a:t>
             </a:r>
             <a:endParaRPr lang="en-US" dirty="0"/>
@@ -1085,30 +1436,30 @@
           <a:p>
             <a:pPr lvl="0"/>
             <a:r>
+              <a:rPr lang="en-US"/>
+              <a:t>Click to edit Master text styles</a:t>
+            </a:r>
+          </a:p>
+        </p:txBody>
+      </p:sp>
+      <p:sp>
+        <p:nvSpPr>
+          <p:cNvPr id="4" name="Date Placeholder 3"/>
+          <p:cNvSpPr>
+            <a:spLocks noGrp="1"/>
+          </p:cNvSpPr>
+          <p:nvPr>
+            <p:ph type="dt" sz="half" idx="10"/>
+          </p:nvPr>
+        </p:nvSpPr>
+        <p:spPr/>
+        <p:txBody>
+          <a:bodyPr/>
+          <a:lstStyle/>
+          <a:p>
+            <a:fld id="{99432F98-8A0E-4C24-BA2E-F43AE2A86A09}" type="datetime1">
               <a:rPr lang="en-US" smtClean="0"/>
-              <a:t>Click to edit Master text styles</a:t>
-            </a:r>
-          </a:p>
-        </p:txBody>
-      </p:sp>
-      <p:sp>
-        <p:nvSpPr>
-          <p:cNvPr id="4" name="Date Placeholder 3"/>
-          <p:cNvSpPr>
-            <a:spLocks noGrp="1"/>
-          </p:cNvSpPr>
-          <p:nvPr>
-            <p:ph type="dt" sz="half" idx="10"/>
-          </p:nvPr>
-        </p:nvSpPr>
-        <p:spPr/>
-        <p:txBody>
-          <a:bodyPr/>
-          <a:lstStyle/>
-          <a:p>
-            <a:fld id="{908A7C6C-0F39-4D70-8E8D-FE5B9C95FA73}" type="datetimeFigureOut">
-              <a:rPr lang="en-US" dirty="0"/>
-              <a:t>2/17/16</a:t>
+              <a:t>9/26/2016</a:t>
             </a:fld>
             <a:endParaRPr lang="en-US" dirty="0"/>
           </a:p>
@@ -1235,7 +1586,7 @@
           <a:lstStyle/>
           <a:p>
             <a:r>
-              <a:rPr lang="en-US" smtClean="0"/>
+              <a:rPr lang="en-US"/>
               <a:t>Click to edit Master title style</a:t>
             </a:r>
             <a:endParaRPr lang="en-US" dirty="0"/>
@@ -1292,35 +1643,35 @@
           <a:p>
             <a:pPr lvl="0"/>
             <a:r>
-              <a:rPr lang="en-US" smtClean="0"/>
+              <a:rPr lang="en-US"/>
               <a:t>Click to edit Master text styles</a:t>
             </a:r>
           </a:p>
           <a:p>
             <a:pPr lvl="1"/>
             <a:r>
-              <a:rPr lang="en-US" smtClean="0"/>
+              <a:rPr lang="en-US"/>
               <a:t>Second level</a:t>
             </a:r>
           </a:p>
           <a:p>
             <a:pPr lvl="2"/>
             <a:r>
-              <a:rPr lang="en-US" smtClean="0"/>
+              <a:rPr lang="en-US"/>
               <a:t>Third level</a:t>
             </a:r>
           </a:p>
           <a:p>
             <a:pPr lvl="3"/>
             <a:r>
-              <a:rPr lang="en-US" smtClean="0"/>
+              <a:rPr lang="en-US"/>
               <a:t>Fourth level</a:t>
             </a:r>
           </a:p>
           <a:p>
             <a:pPr lvl="4"/>
             <a:r>
-              <a:rPr lang="en-US" smtClean="0"/>
+              <a:rPr lang="en-US"/>
               <a:t>Fifth level</a:t>
             </a:r>
             <a:endParaRPr lang="en-US" dirty="0"/>
@@ -1377,59 +1728,59 @@
           <a:p>
             <a:pPr lvl="0"/>
             <a:r>
+              <a:rPr lang="en-US"/>
+              <a:t>Click to edit Master text styles</a:t>
+            </a:r>
+          </a:p>
+          <a:p>
+            <a:pPr lvl="1"/>
+            <a:r>
+              <a:rPr lang="en-US"/>
+              <a:t>Second level</a:t>
+            </a:r>
+          </a:p>
+          <a:p>
+            <a:pPr lvl="2"/>
+            <a:r>
+              <a:rPr lang="en-US"/>
+              <a:t>Third level</a:t>
+            </a:r>
+          </a:p>
+          <a:p>
+            <a:pPr lvl="3"/>
+            <a:r>
+              <a:rPr lang="en-US"/>
+              <a:t>Fourth level</a:t>
+            </a:r>
+          </a:p>
+          <a:p>
+            <a:pPr lvl="4"/>
+            <a:r>
+              <a:rPr lang="en-US"/>
+              <a:t>Fifth level</a:t>
+            </a:r>
+            <a:endParaRPr lang="en-US" dirty="0"/>
+          </a:p>
+        </p:txBody>
+      </p:sp>
+      <p:sp>
+        <p:nvSpPr>
+          <p:cNvPr id="5" name="Date Placeholder 4"/>
+          <p:cNvSpPr>
+            <a:spLocks noGrp="1"/>
+          </p:cNvSpPr>
+          <p:nvPr>
+            <p:ph type="dt" sz="half" idx="10"/>
+          </p:nvPr>
+        </p:nvSpPr>
+        <p:spPr/>
+        <p:txBody>
+          <a:bodyPr/>
+          <a:lstStyle/>
+          <a:p>
+            <a:fld id="{51AD969A-3282-4DE3-A49A-3577742392B4}" type="datetime1">
               <a:rPr lang="en-US" smtClean="0"/>
-              <a:t>Click to edit Master text styles</a:t>
-            </a:r>
-          </a:p>
-          <a:p>
-            <a:pPr lvl="1"/>
-            <a:r>
-              <a:rPr lang="en-US" smtClean="0"/>
-              <a:t>Second level</a:t>
-            </a:r>
-          </a:p>
-          <a:p>
-            <a:pPr lvl="2"/>
-            <a:r>
-              <a:rPr lang="en-US" smtClean="0"/>
-              <a:t>Third level</a:t>
-            </a:r>
-          </a:p>
-          <a:p>
-            <a:pPr lvl="3"/>
-            <a:r>
-              <a:rPr lang="en-US" smtClean="0"/>
-              <a:t>Fourth level</a:t>
-            </a:r>
-          </a:p>
-          <a:p>
-            <a:pPr lvl="4"/>
-            <a:r>
-              <a:rPr lang="en-US" smtClean="0"/>
-              <a:t>Fifth level</a:t>
-            </a:r>
-            <a:endParaRPr lang="en-US" dirty="0"/>
-          </a:p>
-        </p:txBody>
-      </p:sp>
-      <p:sp>
-        <p:nvSpPr>
-          <p:cNvPr id="5" name="Date Placeholder 4"/>
-          <p:cNvSpPr>
-            <a:spLocks noGrp="1"/>
-          </p:cNvSpPr>
-          <p:nvPr>
-            <p:ph type="dt" sz="half" idx="10"/>
-          </p:nvPr>
-        </p:nvSpPr>
-        <p:spPr/>
-        <p:txBody>
-          <a:bodyPr/>
-          <a:lstStyle/>
-          <a:p>
-            <a:fld id="{DFCFA4AC-08CC-42CE-BD01-C191750A04EC}" type="datetimeFigureOut">
-              <a:rPr lang="en-US" dirty="0"/>
-              <a:t>2/17/16</a:t>
+              <a:t>9/26/2016</a:t>
             </a:fld>
             <a:endParaRPr lang="en-US" dirty="0"/>
           </a:p>
@@ -1518,7 +1869,7 @@
           <a:lstStyle/>
           <a:p>
             <a:r>
-              <a:rPr lang="en-US" smtClean="0"/>
+              <a:rPr lang="en-US"/>
               <a:t>Click to edit Master title style</a:t>
             </a:r>
             <a:endParaRPr lang="en-US" dirty="0"/>
@@ -1593,7 +1944,7 @@
           <a:p>
             <a:pPr lvl="0"/>
             <a:r>
-              <a:rPr lang="en-US" smtClean="0"/>
+              <a:rPr lang="en-US"/>
               <a:t>Click to edit Master text styles</a:t>
             </a:r>
           </a:p>
@@ -1649,35 +2000,35 @@
           <a:p>
             <a:pPr lvl="0"/>
             <a:r>
-              <a:rPr lang="en-US" smtClean="0"/>
+              <a:rPr lang="en-US"/>
               <a:t>Click to edit Master text styles</a:t>
             </a:r>
           </a:p>
           <a:p>
             <a:pPr lvl="1"/>
             <a:r>
-              <a:rPr lang="en-US" smtClean="0"/>
+              <a:rPr lang="en-US"/>
               <a:t>Second level</a:t>
             </a:r>
           </a:p>
           <a:p>
             <a:pPr lvl="2"/>
             <a:r>
-              <a:rPr lang="en-US" smtClean="0"/>
+              <a:rPr lang="en-US"/>
               <a:t>Third level</a:t>
             </a:r>
           </a:p>
           <a:p>
             <a:pPr lvl="3"/>
             <a:r>
-              <a:rPr lang="en-US" smtClean="0"/>
+              <a:rPr lang="en-US"/>
               <a:t>Fourth level</a:t>
             </a:r>
           </a:p>
           <a:p>
             <a:pPr lvl="4"/>
             <a:r>
-              <a:rPr lang="en-US" smtClean="0"/>
+              <a:rPr lang="en-US"/>
               <a:t>Fifth level</a:t>
             </a:r>
             <a:endParaRPr lang="en-US" dirty="0"/>
@@ -1767,7 +2118,7 @@
               <a:buNone/>
             </a:pPr>
             <a:r>
-              <a:rPr lang="en-US" smtClean="0"/>
+              <a:rPr lang="en-US"/>
               <a:t>Click to edit Master text styles</a:t>
             </a:r>
           </a:p>
@@ -1823,59 +2174,59 @@
           <a:p>
             <a:pPr lvl="0"/>
             <a:r>
+              <a:rPr lang="en-US"/>
+              <a:t>Click to edit Master text styles</a:t>
+            </a:r>
+          </a:p>
+          <a:p>
+            <a:pPr lvl="1"/>
+            <a:r>
+              <a:rPr lang="en-US"/>
+              <a:t>Second level</a:t>
+            </a:r>
+          </a:p>
+          <a:p>
+            <a:pPr lvl="2"/>
+            <a:r>
+              <a:rPr lang="en-US"/>
+              <a:t>Third level</a:t>
+            </a:r>
+          </a:p>
+          <a:p>
+            <a:pPr lvl="3"/>
+            <a:r>
+              <a:rPr lang="en-US"/>
+              <a:t>Fourth level</a:t>
+            </a:r>
+          </a:p>
+          <a:p>
+            <a:pPr lvl="4"/>
+            <a:r>
+              <a:rPr lang="en-US"/>
+              <a:t>Fifth level</a:t>
+            </a:r>
+            <a:endParaRPr lang="en-US" dirty="0"/>
+          </a:p>
+        </p:txBody>
+      </p:sp>
+      <p:sp>
+        <p:nvSpPr>
+          <p:cNvPr id="7" name="Date Placeholder 6"/>
+          <p:cNvSpPr>
+            <a:spLocks noGrp="1"/>
+          </p:cNvSpPr>
+          <p:nvPr>
+            <p:ph type="dt" sz="half" idx="10"/>
+          </p:nvPr>
+        </p:nvSpPr>
+        <p:spPr/>
+        <p:txBody>
+          <a:bodyPr/>
+          <a:lstStyle/>
+          <a:p>
+            <a:fld id="{42E9E36B-4DF7-43C2-B556-32C42230C987}" type="datetime1">
               <a:rPr lang="en-US" smtClean="0"/>
-              <a:t>Click to edit Master text styles</a:t>
-            </a:r>
-          </a:p>
-          <a:p>
-            <a:pPr lvl="1"/>
-            <a:r>
-              <a:rPr lang="en-US" smtClean="0"/>
-              <a:t>Second level</a:t>
-            </a:r>
-          </a:p>
-          <a:p>
-            <a:pPr lvl="2"/>
-            <a:r>
-              <a:rPr lang="en-US" smtClean="0"/>
-              <a:t>Third level</a:t>
-            </a:r>
-          </a:p>
-          <a:p>
-            <a:pPr lvl="3"/>
-            <a:r>
-              <a:rPr lang="en-US" smtClean="0"/>
-              <a:t>Fourth level</a:t>
-            </a:r>
-          </a:p>
-          <a:p>
-            <a:pPr lvl="4"/>
-            <a:r>
-              <a:rPr lang="en-US" smtClean="0"/>
-              <a:t>Fifth level</a:t>
-            </a:r>
-            <a:endParaRPr lang="en-US" dirty="0"/>
-          </a:p>
-        </p:txBody>
-      </p:sp>
-      <p:sp>
-        <p:nvSpPr>
-          <p:cNvPr id="7" name="Date Placeholder 6"/>
-          <p:cNvSpPr>
-            <a:spLocks noGrp="1"/>
-          </p:cNvSpPr>
-          <p:nvPr>
-            <p:ph type="dt" sz="half" idx="10"/>
-          </p:nvPr>
-        </p:nvSpPr>
-        <p:spPr/>
-        <p:txBody>
-          <a:bodyPr/>
-          <a:lstStyle/>
-          <a:p>
-            <a:fld id="{1BA7A723-92A7-435B-B681-F25B092FEFEB}" type="datetimeFigureOut">
-              <a:rPr lang="en-US" dirty="0"/>
-              <a:t>2/17/16</a:t>
+              <a:t>9/26/2016</a:t>
             </a:fld>
             <a:endParaRPr lang="en-US" dirty="0"/>
           </a:p>
@@ -1964,31 +2315,31 @@
           <a:lstStyle/>
           <a:p>
             <a:r>
+              <a:rPr lang="en-US"/>
+              <a:t>Click to edit Master title style</a:t>
+            </a:r>
+            <a:endParaRPr lang="en-US" dirty="0"/>
+          </a:p>
+        </p:txBody>
+      </p:sp>
+      <p:sp>
+        <p:nvSpPr>
+          <p:cNvPr id="3" name="Date Placeholder 2"/>
+          <p:cNvSpPr>
+            <a:spLocks noGrp="1"/>
+          </p:cNvSpPr>
+          <p:nvPr>
+            <p:ph type="dt" sz="half" idx="10"/>
+          </p:nvPr>
+        </p:nvSpPr>
+        <p:spPr/>
+        <p:txBody>
+          <a:bodyPr/>
+          <a:lstStyle/>
+          <a:p>
+            <a:fld id="{4CE393FA-0177-460E-B4A5-32DD96140989}" type="datetime1">
               <a:rPr lang="en-US" smtClean="0"/>
-              <a:t>Click to edit Master title style</a:t>
-            </a:r>
-            <a:endParaRPr lang="en-US" dirty="0"/>
-          </a:p>
-        </p:txBody>
-      </p:sp>
-      <p:sp>
-        <p:nvSpPr>
-          <p:cNvPr id="3" name="Date Placeholder 2"/>
-          <p:cNvSpPr>
-            <a:spLocks noGrp="1"/>
-          </p:cNvSpPr>
-          <p:nvPr>
-            <p:ph type="dt" sz="half" idx="10"/>
-          </p:nvPr>
-        </p:nvSpPr>
-        <p:spPr/>
-        <p:txBody>
-          <a:bodyPr/>
-          <a:lstStyle/>
-          <a:p>
-            <a:fld id="{4F170639-886C-4FCF-9EAB-ABB5DA3F3F4A}" type="datetimeFigureOut">
-              <a:rPr lang="en-US" dirty="0"/>
-              <a:t>2/17/16</a:t>
+              <a:t>9/26/2016</a:t>
             </a:fld>
             <a:endParaRPr lang="en-US" dirty="0"/>
           </a:p>
@@ -2076,9 +2427,9 @@
           <a:bodyPr/>
           <a:lstStyle/>
           <a:p>
-            <a:fld id="{22230651-31F4-45D2-98AE-A2108F41BC07}" type="datetimeFigureOut">
-              <a:rPr lang="en-US" dirty="0"/>
-              <a:t>2/17/16</a:t>
+            <a:fld id="{1F8BFF0D-957F-4F17-9E71-C5D809095116}" type="datetime1">
+              <a:rPr lang="en-US" smtClean="0"/>
+              <a:t>9/26/2016</a:t>
             </a:fld>
             <a:endParaRPr lang="en-US" dirty="0"/>
           </a:p>
@@ -2178,7 +2529,7 @@
           </a:lstStyle>
           <a:p>
             <a:r>
-              <a:rPr lang="en-US" smtClean="0"/>
+              <a:rPr lang="en-US"/>
               <a:t>Click to edit Master title style</a:t>
             </a:r>
             <a:endParaRPr lang="en-US" dirty="0"/>
@@ -2235,35 +2586,35 @@
           <a:p>
             <a:pPr lvl="0"/>
             <a:r>
-              <a:rPr lang="en-US" smtClean="0"/>
+              <a:rPr lang="en-US"/>
               <a:t>Click to edit Master text styles</a:t>
             </a:r>
           </a:p>
           <a:p>
             <a:pPr lvl="1"/>
             <a:r>
-              <a:rPr lang="en-US" smtClean="0"/>
+              <a:rPr lang="en-US"/>
               <a:t>Second level</a:t>
             </a:r>
           </a:p>
           <a:p>
             <a:pPr lvl="2"/>
             <a:r>
-              <a:rPr lang="en-US" smtClean="0"/>
+              <a:rPr lang="en-US"/>
               <a:t>Third level</a:t>
             </a:r>
           </a:p>
           <a:p>
             <a:pPr lvl="3"/>
             <a:r>
-              <a:rPr lang="en-US" smtClean="0"/>
+              <a:rPr lang="en-US"/>
               <a:t>Fourth level</a:t>
             </a:r>
           </a:p>
           <a:p>
             <a:pPr lvl="4"/>
             <a:r>
-              <a:rPr lang="en-US" smtClean="0"/>
+              <a:rPr lang="en-US"/>
               <a:t>Fifth level</a:t>
             </a:r>
             <a:endParaRPr lang="en-US" dirty="0"/>
@@ -2337,30 +2688,30 @@
           <a:p>
             <a:pPr lvl="0"/>
             <a:r>
+              <a:rPr lang="en-US"/>
+              <a:t>Click to edit Master text styles</a:t>
+            </a:r>
+          </a:p>
+        </p:txBody>
+      </p:sp>
+      <p:sp>
+        <p:nvSpPr>
+          <p:cNvPr id="5" name="Date Placeholder 4"/>
+          <p:cNvSpPr>
+            <a:spLocks noGrp="1"/>
+          </p:cNvSpPr>
+          <p:nvPr>
+            <p:ph type="dt" sz="half" idx="10"/>
+          </p:nvPr>
+        </p:nvSpPr>
+        <p:spPr/>
+        <p:txBody>
+          <a:bodyPr/>
+          <a:lstStyle/>
+          <a:p>
+            <a:fld id="{6B53CED7-DF84-4CDE-8390-1F5C7849A4ED}" type="datetime1">
               <a:rPr lang="en-US" smtClean="0"/>
-              <a:t>Click to edit Master text styles</a:t>
-            </a:r>
-          </a:p>
-        </p:txBody>
-      </p:sp>
-      <p:sp>
-        <p:nvSpPr>
-          <p:cNvPr id="5" name="Date Placeholder 4"/>
-          <p:cNvSpPr>
-            <a:spLocks noGrp="1"/>
-          </p:cNvSpPr>
-          <p:nvPr>
-            <p:ph type="dt" sz="half" idx="10"/>
-          </p:nvPr>
-        </p:nvSpPr>
-        <p:spPr/>
-        <p:txBody>
-          <a:bodyPr/>
-          <a:lstStyle/>
-          <a:p>
-            <a:fld id="{6F53789A-C914-4DB1-8815-80B5EC7335C5}" type="datetimeFigureOut">
-              <a:rPr lang="en-US" dirty="0"/>
-              <a:t>2/17/16</a:t>
+              <a:t>9/26/2016</a:t>
             </a:fld>
             <a:endParaRPr lang="en-US" dirty="0"/>
           </a:p>
@@ -2502,7 +2853,7 @@
           </a:lstStyle>
           <a:p>
             <a:r>
-              <a:rPr lang="en-US" smtClean="0"/>
+              <a:rPr lang="en-US"/>
               <a:t>Click to edit Master title style</a:t>
             </a:r>
             <a:endParaRPr lang="en-US" dirty="0"/>
@@ -2577,7 +2928,7 @@
           </a:lstStyle>
           <a:p>
             <a:r>
-              <a:rPr lang="en-US" smtClean="0"/>
+              <a:rPr lang="en-US"/>
               <a:t>Drag picture to placeholder or click icon to add</a:t>
             </a:r>
             <a:endParaRPr lang="en-US" dirty="0"/>
@@ -2657,30 +3008,30 @@
           <a:p>
             <a:pPr lvl="0"/>
             <a:r>
+              <a:rPr lang="en-US"/>
+              <a:t>Click to edit Master text styles</a:t>
+            </a:r>
+          </a:p>
+        </p:txBody>
+      </p:sp>
+      <p:sp>
+        <p:nvSpPr>
+          <p:cNvPr id="5" name="Date Placeholder 4"/>
+          <p:cNvSpPr>
+            <a:spLocks noGrp="1"/>
+          </p:cNvSpPr>
+          <p:nvPr>
+            <p:ph type="dt" sz="half" idx="10"/>
+          </p:nvPr>
+        </p:nvSpPr>
+        <p:spPr/>
+        <p:txBody>
+          <a:bodyPr/>
+          <a:lstStyle/>
+          <a:p>
+            <a:fld id="{B4AAC8C1-99F0-4EDD-B8E8-5D2C4F7CA4DB}" type="datetime1">
               <a:rPr lang="en-US" smtClean="0"/>
-              <a:t>Click to edit Master text styles</a:t>
-            </a:r>
-          </a:p>
-        </p:txBody>
-      </p:sp>
-      <p:sp>
-        <p:nvSpPr>
-          <p:cNvPr id="5" name="Date Placeholder 4"/>
-          <p:cNvSpPr>
-            <a:spLocks noGrp="1"/>
-          </p:cNvSpPr>
-          <p:nvPr>
-            <p:ph type="dt" sz="half" idx="10"/>
-          </p:nvPr>
-        </p:nvSpPr>
-        <p:spPr/>
-        <p:txBody>
-          <a:bodyPr/>
-          <a:lstStyle/>
-          <a:p>
-            <a:fld id="{5E6440AA-91A0-436F-8FDB-C0F939DCAE21}" type="datetimeFigureOut">
-              <a:rPr lang="en-US" dirty="0"/>
-              <a:t>2/17/16</a:t>
+              <a:t>9/26/2016</a:t>
             </a:fld>
             <a:endParaRPr lang="en-US" dirty="0"/>
           </a:p>
@@ -2824,7 +3175,7 @@
           <a:lstStyle/>
           <a:p>
             <a:r>
-              <a:rPr lang="en-US" smtClean="0"/>
+              <a:rPr lang="en-US"/>
               <a:t>Click to edit Master title style</a:t>
             </a:r>
             <a:endParaRPr lang="en-US" dirty="0"/>
@@ -2858,35 +3209,35 @@
           <a:p>
             <a:pPr lvl="0"/>
             <a:r>
-              <a:rPr lang="en-US" smtClean="0"/>
+              <a:rPr lang="en-US"/>
               <a:t>Click to edit Master text styles</a:t>
             </a:r>
           </a:p>
           <a:p>
             <a:pPr lvl="1"/>
             <a:r>
-              <a:rPr lang="en-US" smtClean="0"/>
+              <a:rPr lang="en-US"/>
               <a:t>Second level</a:t>
             </a:r>
           </a:p>
           <a:p>
             <a:pPr lvl="2"/>
             <a:r>
-              <a:rPr lang="en-US" smtClean="0"/>
+              <a:rPr lang="en-US"/>
               <a:t>Third level</a:t>
             </a:r>
           </a:p>
           <a:p>
             <a:pPr lvl="3"/>
             <a:r>
-              <a:rPr lang="en-US" smtClean="0"/>
+              <a:rPr lang="en-US"/>
               <a:t>Fourth level</a:t>
             </a:r>
           </a:p>
           <a:p>
             <a:pPr lvl="4"/>
             <a:r>
-              <a:rPr lang="en-US" smtClean="0"/>
+              <a:rPr lang="en-US"/>
               <a:t>Fifth level</a:t>
             </a:r>
             <a:endParaRPr lang="en-US" dirty="0"/>
@@ -2927,9 +3278,9 @@
             </a:lvl1pPr>
           </a:lstStyle>
           <a:p>
-            <a:fld id="{0E59FD0C-5451-4CA0-86AF-E70AE3279989}" type="datetimeFigureOut">
-              <a:rPr lang="en-US" dirty="0"/>
-              <a:t>2/17/16</a:t>
+            <a:fld id="{C2818F2D-763D-4540-AB1C-E1563353FA80}" type="datetime1">
+              <a:rPr lang="en-US" smtClean="0"/>
+              <a:t>9/26/2016</a:t>
             </a:fld>
             <a:endParaRPr lang="en-US" dirty="0"/>
           </a:p>
@@ -3034,7 +3385,7 @@
     <p:sldLayoutId id="2147483850" r:id="rId10"/>
     <p:sldLayoutId id="2147483851" r:id="rId11"/>
   </p:sldLayoutIdLst>
-  <p:hf sldNum="0" hdr="0" ftr="0" dt="0"/>
+  <p:hf hdr="0" ftr="0" dt="0"/>
   <p:txStyles>
     <p:titleStyle>
       <a:lvl1pPr algn="l" defTabSz="914400" rtl="0" eaLnBrk="1" latinLnBrk="0" hangingPunct="1">
@@ -3430,10 +3781,9 @@
           <a:lstStyle/>
           <a:p>
             <a:r>
-              <a:rPr lang="en-US" dirty="0" smtClean="0"/>
+              <a:rPr lang="en-US" dirty="0"/>
               <a:t>Programming Fundamentals for Android</a:t>
             </a:r>
-            <a:endParaRPr lang="en-US" dirty="0"/>
           </a:p>
         </p:txBody>
       </p:sp>
@@ -3453,23 +3803,34 @@
           <a:lstStyle/>
           <a:p>
             <a:r>
-              <a:rPr lang="en-US" dirty="0" smtClean="0"/>
+              <a:rPr lang="en-US" dirty="0"/>
               <a:t>Week 5: Classes and Objects</a:t>
             </a:r>
           </a:p>
-          <a:p>
-            <a:r>
+        </p:txBody>
+      </p:sp>
+      <p:sp>
+        <p:nvSpPr>
+          <p:cNvPr id="4" name="Slide Number Placeholder 3"/>
+          <p:cNvSpPr>
+            <a:spLocks noGrp="1"/>
+          </p:cNvSpPr>
+          <p:nvPr>
+            <p:ph type="sldNum" sz="quarter" idx="12"/>
+          </p:nvPr>
+        </p:nvSpPr>
+        <p:spPr/>
+        <p:txBody>
+          <a:bodyPr>
+            <a:normAutofit lnSpcReduction="10000"/>
+          </a:bodyPr>
+          <a:lstStyle/>
+          <a:p>
+            <a:fld id="{4FAB73BC-B049-4115-A692-8D63A059BFB8}" type="slidenum">
               <a:rPr lang="en-US" smtClean="0"/>
-              <a:t>February </a:t>
-            </a:r>
-            <a:r>
-              <a:rPr lang="en-US" smtClean="0"/>
-              <a:t>18, </a:t>
-            </a:r>
-            <a:r>
-              <a:rPr lang="en-US" dirty="0" smtClean="0"/>
-              <a:t>2016</a:t>
-            </a:r>
+              <a:pPr/>
+              <a:t>1</a:t>
+            </a:fld>
             <a:endParaRPr lang="en-US" dirty="0"/>
           </a:p>
         </p:txBody>
@@ -3520,10 +3881,9 @@
           <a:lstStyle/>
           <a:p>
             <a:r>
-              <a:rPr lang="en-US" dirty="0" smtClean="0"/>
+              <a:rPr lang="en-US" dirty="0"/>
               <a:t>Instance Methods</a:t>
             </a:r>
-            <a:endParaRPr lang="en-US" dirty="0"/>
           </a:p>
         </p:txBody>
       </p:sp>
@@ -3550,22 +3910,22 @@
           <a:lstStyle/>
           <a:p>
             <a:r>
-              <a:rPr lang="en-US" sz="2000" dirty="0" smtClean="0"/>
+              <a:rPr lang="en-US" sz="2000" dirty="0"/>
               <a:t>Used to represent behavior associated with an object</a:t>
             </a:r>
           </a:p>
           <a:p>
             <a:r>
-              <a:rPr lang="en-US" sz="2000" dirty="0" smtClean="0"/>
+              <a:rPr lang="en-US" sz="2000" dirty="0"/>
               <a:t>Must be accessed using object’s name</a:t>
             </a:r>
           </a:p>
           <a:p>
             <a:r>
-              <a:rPr lang="en-US" sz="2000" dirty="0" smtClean="0"/>
+              <a:rPr lang="en-US" sz="2000" dirty="0"/>
               <a:t>Can access and modify class and instance fields</a:t>
             </a:r>
-            <a:endParaRPr lang="en-US" sz="2000" i="1" dirty="0" smtClean="0"/>
+            <a:endParaRPr lang="en-US" sz="2000" i="1" dirty="0"/>
           </a:p>
         </p:txBody>
       </p:sp>
@@ -3599,7 +3959,7 @@
               <a:buNone/>
             </a:pPr>
             <a:r>
-              <a:rPr lang="en-US" dirty="0" err="1" smtClean="0">
+              <a:rPr lang="en-US" dirty="0" err="1">
                 <a:solidFill>
                   <a:srgbClr val="FF0000"/>
                 </a:solidFill>
@@ -3610,17 +3970,6 @@
               <a:t>return_type</a:t>
             </a:r>
             <a:r>
-              <a:rPr lang="en-US" dirty="0" smtClean="0">
-                <a:solidFill>
-                  <a:srgbClr val="FF0000"/>
-                </a:solidFill>
-                <a:latin typeface="Consolas" charset="0"/>
-                <a:ea typeface="Consolas" charset="0"/>
-                <a:cs typeface="Consolas" charset="0"/>
-              </a:rPr>
-              <a:t> </a:t>
-            </a:r>
-            <a:r>
               <a:rPr lang="en-US" dirty="0">
                 <a:solidFill>
                   <a:srgbClr val="FF0000"/>
@@ -3629,7 +3978,7 @@
                 <a:ea typeface="Consolas" charset="0"/>
                 <a:cs typeface="Consolas" charset="0"/>
               </a:rPr>
-              <a:t>name(</a:t>
+              <a:t> name(</a:t>
             </a:r>
             <a:r>
               <a:rPr lang="en-US" dirty="0" err="1">
@@ -3651,18 +4000,7 @@
                 <a:ea typeface="Consolas" charset="0"/>
                 <a:cs typeface="Consolas" charset="0"/>
               </a:rPr>
-              <a:t>) </a:t>
-            </a:r>
-            <a:r>
-              <a:rPr lang="en-US" dirty="0" smtClean="0">
-                <a:solidFill>
-                  <a:srgbClr val="FF0000"/>
-                </a:solidFill>
-                <a:latin typeface="Consolas" charset="0"/>
-                <a:ea typeface="Consolas" charset="0"/>
-                <a:cs typeface="Consolas" charset="0"/>
-              </a:rPr>
-              <a:t>{</a:t>
+              <a:t>) {</a:t>
             </a:r>
           </a:p>
           <a:p>
@@ -3675,17 +4013,6 @@
               </a:spcAft>
               <a:buNone/>
             </a:pPr>
-            <a:r>
-              <a:rPr lang="en-US" dirty="0" smtClean="0">
-                <a:solidFill>
-                  <a:srgbClr val="FF0000"/>
-                </a:solidFill>
-                <a:latin typeface="Consolas" charset="0"/>
-                <a:ea typeface="Consolas" charset="0"/>
-                <a:cs typeface="Consolas" charset="0"/>
-              </a:rPr>
-              <a:t>    //</a:t>
-            </a:r>
             <a:r>
               <a:rPr lang="en-US" dirty="0">
                 <a:solidFill>
@@ -3695,18 +4022,7 @@
                 <a:ea typeface="Consolas" charset="0"/>
                 <a:cs typeface="Consolas" charset="0"/>
               </a:rPr>
-              <a:t>statements to </a:t>
-            </a:r>
-            <a:r>
-              <a:rPr lang="en-US" dirty="0" smtClean="0">
-                <a:solidFill>
-                  <a:srgbClr val="FF0000"/>
-                </a:solidFill>
-                <a:latin typeface="Consolas" charset="0"/>
-                <a:ea typeface="Consolas" charset="0"/>
-                <a:cs typeface="Consolas" charset="0"/>
-              </a:rPr>
-              <a:t>execute</a:t>
+              <a:t>    //statements to execute</a:t>
             </a:r>
           </a:p>
           <a:p>
@@ -3720,7 +4036,7 @@
               <a:buNone/>
             </a:pPr>
             <a:r>
-              <a:rPr lang="en-US" dirty="0" smtClean="0">
+              <a:rPr lang="en-US" dirty="0">
                 <a:solidFill>
                   <a:srgbClr val="FF0000"/>
                 </a:solidFill>
@@ -3730,14 +4046,31 @@
               </a:rPr>
               <a:t>}</a:t>
             </a:r>
-            <a:endParaRPr lang="en-US" dirty="0">
-              <a:solidFill>
-                <a:srgbClr val="FF0000"/>
-              </a:solidFill>
-              <a:latin typeface="Consolas" charset="0"/>
-              <a:ea typeface="Consolas" charset="0"/>
-              <a:cs typeface="Consolas" charset="0"/>
-            </a:endParaRPr>
+          </a:p>
+        </p:txBody>
+      </p:sp>
+      <p:sp>
+        <p:nvSpPr>
+          <p:cNvPr id="2" name="Slide Number Placeholder 1"/>
+          <p:cNvSpPr>
+            <a:spLocks noGrp="1"/>
+          </p:cNvSpPr>
+          <p:nvPr>
+            <p:ph type="sldNum" sz="quarter" idx="12"/>
+          </p:nvPr>
+        </p:nvSpPr>
+        <p:spPr/>
+        <p:txBody>
+          <a:bodyPr>
+            <a:normAutofit lnSpcReduction="10000"/>
+          </a:bodyPr>
+          <a:lstStyle/>
+          <a:p>
+            <a:fld id="{4FAB73BC-B049-4115-A692-8D63A059BFB8}" type="slidenum">
+              <a:rPr lang="en-US" smtClean="0"/>
+              <a:t>10</a:t>
+            </a:fld>
+            <a:endParaRPr lang="en-US" dirty="0"/>
           </a:p>
         </p:txBody>
       </p:sp>
@@ -3787,10 +4120,9 @@
           <a:lstStyle/>
           <a:p>
             <a:r>
-              <a:rPr lang="en-US" dirty="0" smtClean="0"/>
+              <a:rPr lang="en-US" dirty="0"/>
               <a:t>Access Control</a:t>
             </a:r>
-            <a:endParaRPr lang="en-US" dirty="0"/>
           </a:p>
         </p:txBody>
       </p:sp>
@@ -3812,43 +4144,68 @@
           <a:lstStyle/>
           <a:p>
             <a:r>
-              <a:rPr lang="en-US" sz="2400" dirty="0" smtClean="0"/>
+              <a:rPr lang="en-US" sz="2400" dirty="0"/>
               <a:t>Class exposes an </a:t>
             </a:r>
             <a:r>
-              <a:rPr lang="en-US" sz="2400" i="1" dirty="0" smtClean="0"/>
+              <a:rPr lang="en-US" sz="2400" i="1" dirty="0"/>
               <a:t>interface</a:t>
             </a:r>
             <a:r>
-              <a:rPr lang="en-US" sz="2400" dirty="0" smtClean="0"/>
+              <a:rPr lang="en-US" sz="2400" dirty="0"/>
               <a:t> – constructors, methods, and fields accessible outside of the class</a:t>
             </a:r>
           </a:p>
           <a:p>
             <a:r>
-              <a:rPr lang="en-US" sz="2400" dirty="0" smtClean="0"/>
+              <a:rPr lang="en-US" sz="2400" dirty="0"/>
               <a:t>Interface should not change</a:t>
             </a:r>
           </a:p>
           <a:p>
             <a:r>
-              <a:rPr lang="en-US" sz="2400" dirty="0" smtClean="0"/>
+              <a:rPr lang="en-US" sz="2400" dirty="0"/>
               <a:t>Class also provides an </a:t>
             </a:r>
             <a:r>
-              <a:rPr lang="en-US" sz="2400" i="1" dirty="0" smtClean="0"/>
+              <a:rPr lang="en-US" sz="2400" i="1" dirty="0"/>
               <a:t>implementation </a:t>
             </a:r>
             <a:r>
-              <a:rPr lang="en-US" sz="2400" dirty="0" smtClean="0"/>
+              <a:rPr lang="en-US" sz="2400" dirty="0"/>
               <a:t>– code that supports the interface such as helper methods or fields with special values</a:t>
             </a:r>
           </a:p>
           <a:p>
             <a:r>
-              <a:rPr lang="en-US" sz="2400" dirty="0" smtClean="0"/>
+              <a:rPr lang="en-US" sz="2400" dirty="0"/>
               <a:t>Hiding the implementation lets us change it later without breaking the interface</a:t>
             </a:r>
+          </a:p>
+        </p:txBody>
+      </p:sp>
+      <p:sp>
+        <p:nvSpPr>
+          <p:cNvPr id="2" name="Slide Number Placeholder 1"/>
+          <p:cNvSpPr>
+            <a:spLocks noGrp="1"/>
+          </p:cNvSpPr>
+          <p:nvPr>
+            <p:ph type="sldNum" sz="quarter" idx="12"/>
+          </p:nvPr>
+        </p:nvSpPr>
+        <p:spPr/>
+        <p:txBody>
+          <a:bodyPr>
+            <a:normAutofit lnSpcReduction="10000"/>
+          </a:bodyPr>
+          <a:lstStyle/>
+          <a:p>
+            <a:fld id="{4FAB73BC-B049-4115-A692-8D63A059BFB8}" type="slidenum">
+              <a:rPr lang="en-US" smtClean="0"/>
+              <a:t>11</a:t>
+            </a:fld>
+            <a:endParaRPr lang="en-US" dirty="0"/>
           </a:p>
         </p:txBody>
       </p:sp>
@@ -3898,10 +4255,9 @@
           <a:lstStyle/>
           <a:p>
             <a:r>
-              <a:rPr lang="en-US" dirty="0" smtClean="0"/>
+              <a:rPr lang="en-US" dirty="0"/>
               <a:t>Access Control</a:t>
             </a:r>
-            <a:endParaRPr lang="en-US" dirty="0"/>
           </a:p>
         </p:txBody>
       </p:sp>
@@ -3931,7 +4287,7 @@
               </a:spcAft>
             </a:pPr>
             <a:r>
-              <a:rPr lang="en-US" sz="2400" dirty="0" smtClean="0"/>
+              <a:rPr lang="en-US" sz="2400" dirty="0"/>
               <a:t>Java provides four levels of access control</a:t>
             </a:r>
           </a:p>
@@ -3945,11 +4301,11 @@
               </a:spcAft>
             </a:pPr>
             <a:r>
-              <a:rPr lang="en-US" sz="2200" b="1" dirty="0" smtClean="0"/>
+              <a:rPr lang="en-US" sz="2200" b="1" dirty="0"/>
               <a:t>public</a:t>
             </a:r>
             <a:r>
-              <a:rPr lang="en-US" sz="2200" dirty="0" smtClean="0"/>
+              <a:rPr lang="en-US" sz="2200" dirty="0"/>
               <a:t>: accessible from anywhere</a:t>
             </a:r>
           </a:p>
@@ -3963,11 +4319,11 @@
               </a:spcAft>
             </a:pPr>
             <a:r>
-              <a:rPr lang="en-US" sz="2200" b="1" dirty="0" smtClean="0"/>
+              <a:rPr lang="en-US" sz="2200" b="1" dirty="0"/>
               <a:t>protected</a:t>
             </a:r>
             <a:r>
-              <a:rPr lang="en-US" sz="2200" dirty="0" smtClean="0"/>
+              <a:rPr lang="en-US" sz="2200" dirty="0"/>
               <a:t>: accessible from all classes in the same package as well as subclasses</a:t>
             </a:r>
           </a:p>
@@ -3981,11 +4337,11 @@
               </a:spcAft>
             </a:pPr>
             <a:r>
-              <a:rPr lang="en-US" sz="2200" b="1" dirty="0" smtClean="0"/>
+              <a:rPr lang="en-US" sz="2200" b="1" dirty="0"/>
               <a:t>private</a:t>
             </a:r>
             <a:r>
-              <a:rPr lang="en-US" sz="2200" dirty="0" smtClean="0"/>
+              <a:rPr lang="en-US" sz="2200" dirty="0"/>
               <a:t>: only accessible from within the class itself</a:t>
             </a:r>
           </a:p>
@@ -3999,11 +4355,11 @@
               </a:spcAft>
             </a:pPr>
             <a:r>
-              <a:rPr lang="en-US" sz="2200" b="1" dirty="0" smtClean="0"/>
+              <a:rPr lang="en-US" sz="2200" b="1" dirty="0"/>
               <a:t>package-private</a:t>
             </a:r>
             <a:r>
-              <a:rPr lang="en-US" sz="2200" dirty="0" smtClean="0"/>
+              <a:rPr lang="en-US" sz="2200" dirty="0"/>
               <a:t>: accessible to classes in the same package; this is the default level</a:t>
             </a:r>
           </a:p>
@@ -4017,9 +4373,34 @@
               </a:spcAft>
             </a:pPr>
             <a:r>
-              <a:rPr lang="en-US" sz="2400" dirty="0" smtClean="0"/>
+              <a:rPr lang="en-US" sz="2400" dirty="0"/>
               <a:t>Specify access control level by prefixing field, class, and method declarations </a:t>
             </a:r>
+          </a:p>
+        </p:txBody>
+      </p:sp>
+      <p:sp>
+        <p:nvSpPr>
+          <p:cNvPr id="2" name="Slide Number Placeholder 1"/>
+          <p:cNvSpPr>
+            <a:spLocks noGrp="1"/>
+          </p:cNvSpPr>
+          <p:nvPr>
+            <p:ph type="sldNum" sz="quarter" idx="12"/>
+          </p:nvPr>
+        </p:nvSpPr>
+        <p:spPr/>
+        <p:txBody>
+          <a:bodyPr>
+            <a:normAutofit lnSpcReduction="10000"/>
+          </a:bodyPr>
+          <a:lstStyle/>
+          <a:p>
+            <a:fld id="{4FAB73BC-B049-4115-A692-8D63A059BFB8}" type="slidenum">
+              <a:rPr lang="en-US" smtClean="0"/>
+              <a:t>12</a:t>
+            </a:fld>
+            <a:endParaRPr lang="en-US" dirty="0"/>
           </a:p>
         </p:txBody>
       </p:sp>
@@ -4055,7 +4436,7 @@
       </p:grpSpPr>
       <p:sp>
         <p:nvSpPr>
-          <p:cNvPr id="3" name="Title 2"/>
+          <p:cNvPr id="9" name="Title 8"/>
           <p:cNvSpPr>
             <a:spLocks noGrp="1"/>
           </p:cNvSpPr>
@@ -4069,58 +4450,60 @@
           <a:lstStyle/>
           <a:p>
             <a:r>
-              <a:rPr lang="en-US" dirty="0" smtClean="0"/>
-              <a:t>Initializers</a:t>
-            </a:r>
-            <a:endParaRPr lang="en-US" dirty="0"/>
-          </a:p>
-        </p:txBody>
-      </p:sp>
-      <p:sp>
-        <p:nvSpPr>
-          <p:cNvPr id="4" name="Text Placeholder 3"/>
-          <p:cNvSpPr>
-            <a:spLocks noGrp="1"/>
-          </p:cNvSpPr>
-          <p:nvPr>
-            <p:ph idx="1"/>
-          </p:nvPr>
-        </p:nvSpPr>
-        <p:spPr/>
-        <p:txBody>
-          <a:bodyPr anchor="ctr">
-            <a:normAutofit/>
+              <a:rPr lang="en-US" dirty="0"/>
+              <a:t>Garbage Collection</a:t>
+            </a:r>
+          </a:p>
+        </p:txBody>
+      </p:sp>
+      <p:sp>
+        <p:nvSpPr>
+          <p:cNvPr id="10" name="Text Placeholder 9"/>
+          <p:cNvSpPr>
+            <a:spLocks noGrp="1"/>
+          </p:cNvSpPr>
+          <p:nvPr>
+            <p:ph type="body" idx="1"/>
+          </p:nvPr>
+        </p:nvSpPr>
+        <p:spPr/>
+        <p:txBody>
+          <a:bodyPr/>
+          <a:lstStyle/>
+          <a:p>
+            <a:endParaRPr lang="en-US" dirty="0"/>
+          </a:p>
+        </p:txBody>
+      </p:sp>
+      <p:sp>
+        <p:nvSpPr>
+          <p:cNvPr id="2" name="Slide Number Placeholder 1"/>
+          <p:cNvSpPr>
+            <a:spLocks noGrp="1"/>
+          </p:cNvSpPr>
+          <p:nvPr>
+            <p:ph type="sldNum" sz="quarter" idx="12"/>
+          </p:nvPr>
+        </p:nvSpPr>
+        <p:spPr/>
+        <p:txBody>
+          <a:bodyPr>
+            <a:normAutofit lnSpcReduction="10000"/>
           </a:bodyPr>
           <a:lstStyle/>
           <a:p>
-            <a:r>
-              <a:rPr lang="en-US" sz="2400" dirty="0" smtClean="0"/>
-              <a:t>Block of code written into class body that can be used to initialize fields</a:t>
-            </a:r>
-          </a:p>
-          <a:p>
-            <a:r>
-              <a:rPr lang="en-US" sz="2400" dirty="0" smtClean="0"/>
-              <a:t>Class initializers are specified using the reserved word </a:t>
-            </a:r>
-            <a:r>
-              <a:rPr lang="en-US" sz="2400" i="1" dirty="0" smtClean="0"/>
-              <a:t>static</a:t>
-            </a:r>
-            <a:endParaRPr lang="en-US" sz="2400" dirty="0" smtClean="0"/>
-          </a:p>
-          <a:p>
-            <a:r>
-              <a:rPr lang="en-US" sz="2400" dirty="0" smtClean="0"/>
-              <a:t>Typically instance initializers can be avoided by using constructors</a:t>
-            </a:r>
+            <a:fld id="{4FAB73BC-B049-4115-A692-8D63A059BFB8}" type="slidenum">
+              <a:rPr lang="en-US" smtClean="0"/>
+              <a:t>13</a:t>
+            </a:fld>
+            <a:endParaRPr lang="en-US" dirty="0"/>
           </a:p>
         </p:txBody>
       </p:sp>
     </p:spTree>
     <p:extLst>
       <p:ext uri="{BB962C8B-B14F-4D97-AF65-F5344CB8AC3E}">
-        <p14:creationId xmlns:p14="http://schemas.microsoft.com/office/powerpoint/2010/main" val="1737719949"/>
+        <p14:creationId xmlns:p14="http://schemas.microsoft.com/office/powerpoint/2010/main" val="797379249"/>
       </p:ext>
     </p:extLst>
   </p:cSld>
@@ -4149,7 +4532,7 @@
       </p:grpSpPr>
       <p:sp>
         <p:nvSpPr>
-          <p:cNvPr id="9" name="Title 8"/>
+          <p:cNvPr id="2" name="Title 1"/>
           <p:cNvSpPr>
             <a:spLocks noGrp="1"/>
           </p:cNvSpPr>
@@ -4163,28 +4546,159 @@
           <a:lstStyle/>
           <a:p>
             <a:r>
-              <a:rPr lang="en-US" dirty="0" smtClean="0"/>
+              <a:rPr lang="en-US" dirty="0"/>
               <a:t>Garbage Collection</a:t>
             </a:r>
-            <a:endParaRPr lang="en-US" dirty="0"/>
-          </a:p>
-        </p:txBody>
-      </p:sp>
-      <p:sp>
-        <p:nvSpPr>
-          <p:cNvPr id="10" name="Text Placeholder 9"/>
-          <p:cNvSpPr>
-            <a:spLocks noGrp="1"/>
-          </p:cNvSpPr>
-          <p:nvPr>
-            <p:ph type="body" idx="1"/>
-          </p:nvPr>
-        </p:nvSpPr>
-        <p:spPr/>
-        <p:txBody>
-          <a:bodyPr/>
-          <a:lstStyle/>
-          <a:p>
+          </a:p>
+        </p:txBody>
+      </p:sp>
+      <p:sp>
+        <p:nvSpPr>
+          <p:cNvPr id="3" name="Content Placeholder 2"/>
+          <p:cNvSpPr>
+            <a:spLocks noGrp="1"/>
+          </p:cNvSpPr>
+          <p:nvPr>
+            <p:ph idx="1"/>
+          </p:nvPr>
+        </p:nvSpPr>
+        <p:spPr/>
+        <p:txBody>
+          <a:bodyPr anchor="ctr">
+            <a:noAutofit/>
+          </a:bodyPr>
+          <a:lstStyle/>
+          <a:p>
+            <a:pPr>
+              <a:lnSpc>
+                <a:spcPct val="100000"/>
+              </a:lnSpc>
+              <a:spcBef>
+                <a:spcPts val="0"/>
+              </a:spcBef>
+              <a:spcAft>
+                <a:spcPts val="1200"/>
+              </a:spcAft>
+            </a:pPr>
+            <a:r>
+              <a:rPr lang="en-US" sz="2400" dirty="0">
+                <a:ea typeface="Consolas" charset="0"/>
+                <a:cs typeface="Consolas" charset="0"/>
+              </a:rPr>
+              <a:t>Objects consume memory</a:t>
+            </a:r>
+          </a:p>
+          <a:p>
+            <a:pPr>
+              <a:lnSpc>
+                <a:spcPct val="100000"/>
+              </a:lnSpc>
+              <a:spcBef>
+                <a:spcPts val="0"/>
+              </a:spcBef>
+              <a:spcAft>
+                <a:spcPts val="1200"/>
+              </a:spcAft>
+            </a:pPr>
+            <a:r>
+              <a:rPr lang="en-US" sz="2400" dirty="0">
+                <a:ea typeface="Consolas" charset="0"/>
+                <a:cs typeface="Consolas" charset="0"/>
+              </a:rPr>
+              <a:t>Java provides a </a:t>
+            </a:r>
+            <a:r>
+              <a:rPr lang="en-US" sz="2400" i="1" dirty="0">
+                <a:ea typeface="Consolas" charset="0"/>
+                <a:cs typeface="Consolas" charset="0"/>
+              </a:rPr>
+              <a:t>garbage collector </a:t>
+            </a:r>
+            <a:r>
+              <a:rPr lang="en-US" sz="2400" dirty="0">
+                <a:ea typeface="Consolas" charset="0"/>
+                <a:cs typeface="Consolas" charset="0"/>
+              </a:rPr>
+              <a:t>that occasionally runs and frees memory for unreferenced objects</a:t>
+            </a:r>
+          </a:p>
+          <a:p>
+            <a:pPr>
+              <a:lnSpc>
+                <a:spcPct val="100000"/>
+              </a:lnSpc>
+              <a:spcBef>
+                <a:spcPts val="0"/>
+              </a:spcBef>
+              <a:spcAft>
+                <a:spcPts val="1200"/>
+              </a:spcAft>
+            </a:pPr>
+            <a:r>
+              <a:rPr lang="en-US" sz="2400" dirty="0">
+                <a:ea typeface="Consolas" charset="0"/>
+                <a:cs typeface="Consolas" charset="0"/>
+              </a:rPr>
+              <a:t>An </a:t>
+            </a:r>
+            <a:r>
+              <a:rPr lang="en-US" sz="2400" i="1" dirty="0">
+                <a:ea typeface="Consolas" charset="0"/>
+                <a:cs typeface="Consolas" charset="0"/>
+              </a:rPr>
+              <a:t>unreferenced object</a:t>
+            </a:r>
+            <a:r>
+              <a:rPr lang="en-US" sz="2400" dirty="0">
+                <a:ea typeface="Consolas" charset="0"/>
+                <a:cs typeface="Consolas" charset="0"/>
+              </a:rPr>
+              <a:t> is an object that cannot be access from anywhere else in the program</a:t>
+            </a:r>
+          </a:p>
+          <a:p>
+            <a:pPr>
+              <a:lnSpc>
+                <a:spcPct val="100000"/>
+              </a:lnSpc>
+              <a:spcBef>
+                <a:spcPts val="0"/>
+              </a:spcBef>
+              <a:spcAft>
+                <a:spcPts val="1200"/>
+              </a:spcAft>
+            </a:pPr>
+            <a:r>
+              <a:rPr lang="en-US" sz="2400" dirty="0">
+                <a:ea typeface="Consolas" charset="0"/>
+                <a:cs typeface="Consolas" charset="0"/>
+              </a:rPr>
+              <a:t>We should be aware of references that exist to objects – especially if a program uses more memory than expected</a:t>
+            </a:r>
+          </a:p>
+        </p:txBody>
+      </p:sp>
+      <p:sp>
+        <p:nvSpPr>
+          <p:cNvPr id="4" name="Slide Number Placeholder 3"/>
+          <p:cNvSpPr>
+            <a:spLocks noGrp="1"/>
+          </p:cNvSpPr>
+          <p:nvPr>
+            <p:ph type="sldNum" sz="quarter" idx="12"/>
+          </p:nvPr>
+        </p:nvSpPr>
+        <p:spPr/>
+        <p:txBody>
+          <a:bodyPr>
+            <a:normAutofit lnSpcReduction="10000"/>
+          </a:bodyPr>
+          <a:lstStyle/>
+          <a:p>
+            <a:fld id="{4FAB73BC-B049-4115-A692-8D63A059BFB8}" type="slidenum">
+              <a:rPr lang="en-US" smtClean="0"/>
+              <a:t>14</a:t>
+            </a:fld>
             <a:endParaRPr lang="en-US" dirty="0"/>
           </a:p>
         </p:txBody>
@@ -4192,7 +4706,7 @@
     </p:spTree>
     <p:extLst>
       <p:ext uri="{BB962C8B-B14F-4D97-AF65-F5344CB8AC3E}">
-        <p14:creationId xmlns:p14="http://schemas.microsoft.com/office/powerpoint/2010/main" val="797379249"/>
+        <p14:creationId xmlns:p14="http://schemas.microsoft.com/office/powerpoint/2010/main" val="1548663387"/>
       </p:ext>
     </p:extLst>
   </p:cSld>
@@ -4235,189 +4749,9 @@
           <a:lstStyle/>
           <a:p>
             <a:r>
-              <a:rPr lang="en-US" dirty="0" smtClean="0"/>
-              <a:t>Garbage Collection</a:t>
-            </a:r>
-            <a:endParaRPr lang="en-US" dirty="0"/>
-          </a:p>
-        </p:txBody>
-      </p:sp>
-      <p:sp>
-        <p:nvSpPr>
-          <p:cNvPr id="3" name="Content Placeholder 2"/>
-          <p:cNvSpPr>
-            <a:spLocks noGrp="1"/>
-          </p:cNvSpPr>
-          <p:nvPr>
-            <p:ph idx="1"/>
-          </p:nvPr>
-        </p:nvSpPr>
-        <p:spPr/>
-        <p:txBody>
-          <a:bodyPr anchor="ctr">
-            <a:noAutofit/>
-          </a:bodyPr>
-          <a:lstStyle/>
-          <a:p>
-            <a:pPr>
-              <a:lnSpc>
-                <a:spcPct val="100000"/>
-              </a:lnSpc>
-              <a:spcBef>
-                <a:spcPts val="0"/>
-              </a:spcBef>
-              <a:spcAft>
-                <a:spcPts val="1200"/>
-              </a:spcAft>
-            </a:pPr>
-            <a:r>
-              <a:rPr lang="en-US" sz="2400" dirty="0" smtClean="0">
-                <a:ea typeface="Consolas" charset="0"/>
-                <a:cs typeface="Consolas" charset="0"/>
-              </a:rPr>
-              <a:t>Objects consume memory</a:t>
-            </a:r>
-          </a:p>
-          <a:p>
-            <a:pPr>
-              <a:lnSpc>
-                <a:spcPct val="100000"/>
-              </a:lnSpc>
-              <a:spcBef>
-                <a:spcPts val="0"/>
-              </a:spcBef>
-              <a:spcAft>
-                <a:spcPts val="1200"/>
-              </a:spcAft>
-            </a:pPr>
-            <a:r>
-              <a:rPr lang="en-US" sz="2400" dirty="0" smtClean="0">
-                <a:ea typeface="Consolas" charset="0"/>
-                <a:cs typeface="Consolas" charset="0"/>
-              </a:rPr>
-              <a:t>Java provides a </a:t>
-            </a:r>
-            <a:r>
-              <a:rPr lang="en-US" sz="2400" i="1" dirty="0" smtClean="0">
-                <a:ea typeface="Consolas" charset="0"/>
-                <a:cs typeface="Consolas" charset="0"/>
-              </a:rPr>
-              <a:t>garbage collector </a:t>
-            </a:r>
-            <a:r>
-              <a:rPr lang="en-US" sz="2400" dirty="0" smtClean="0">
-                <a:ea typeface="Consolas" charset="0"/>
-                <a:cs typeface="Consolas" charset="0"/>
-              </a:rPr>
-              <a:t>that occasionally runs and frees memory for unreferenced objects</a:t>
-            </a:r>
-          </a:p>
-          <a:p>
-            <a:pPr>
-              <a:lnSpc>
-                <a:spcPct val="100000"/>
-              </a:lnSpc>
-              <a:spcBef>
-                <a:spcPts val="0"/>
-              </a:spcBef>
-              <a:spcAft>
-                <a:spcPts val="1200"/>
-              </a:spcAft>
-            </a:pPr>
-            <a:r>
-              <a:rPr lang="en-US" sz="2400" dirty="0" smtClean="0">
-                <a:ea typeface="Consolas" charset="0"/>
-                <a:cs typeface="Consolas" charset="0"/>
-              </a:rPr>
-              <a:t>An </a:t>
-            </a:r>
-            <a:r>
-              <a:rPr lang="en-US" sz="2400" i="1" dirty="0" smtClean="0">
-                <a:ea typeface="Consolas" charset="0"/>
-                <a:cs typeface="Consolas" charset="0"/>
-              </a:rPr>
-              <a:t>unreferenced object</a:t>
-            </a:r>
-            <a:r>
-              <a:rPr lang="en-US" sz="2400" dirty="0" smtClean="0">
-                <a:ea typeface="Consolas" charset="0"/>
-                <a:cs typeface="Consolas" charset="0"/>
-              </a:rPr>
-              <a:t> is an object that cannot be access from anywhere else in the program</a:t>
-            </a:r>
-          </a:p>
-          <a:p>
-            <a:pPr>
-              <a:lnSpc>
-                <a:spcPct val="100000"/>
-              </a:lnSpc>
-              <a:spcBef>
-                <a:spcPts val="0"/>
-              </a:spcBef>
-              <a:spcAft>
-                <a:spcPts val="1200"/>
-              </a:spcAft>
-            </a:pPr>
-            <a:r>
-              <a:rPr lang="en-US" sz="2400" dirty="0" smtClean="0">
-                <a:ea typeface="Consolas" charset="0"/>
-                <a:cs typeface="Consolas" charset="0"/>
-              </a:rPr>
-              <a:t>We should be aware of references that exist to objects – especially if a program uses more memory than expected</a:t>
-            </a:r>
-          </a:p>
-        </p:txBody>
-      </p:sp>
-    </p:spTree>
-    <p:extLst>
-      <p:ext uri="{BB962C8B-B14F-4D97-AF65-F5344CB8AC3E}">
-        <p14:creationId xmlns:p14="http://schemas.microsoft.com/office/powerpoint/2010/main" val="1548663387"/>
-      </p:ext>
-    </p:extLst>
-  </p:cSld>
-  <p:clrMapOvr>
-    <a:masterClrMapping/>
-  </p:clrMapOvr>
-</p:sld>
-</file>
-
-<file path=ppt/slides/slide16.xml><?xml version="1.0" encoding="utf-8"?>
-<p:sld xmlns:a="http://schemas.openxmlformats.org/drawingml/2006/main" xmlns:r="http://schemas.openxmlformats.org/officeDocument/2006/relationships" xmlns:p="http://schemas.openxmlformats.org/presentationml/2006/main">
-  <p:cSld>
-    <p:spTree>
-      <p:nvGrpSpPr>
-        <p:cNvPr id="1" name=""/>
-        <p:cNvGrpSpPr/>
-        <p:nvPr/>
-      </p:nvGrpSpPr>
-      <p:grpSpPr>
-        <a:xfrm>
-          <a:off x="0" y="0"/>
-          <a:ext cx="0" cy="0"/>
-          <a:chOff x="0" y="0"/>
-          <a:chExt cx="0" cy="0"/>
-        </a:xfrm>
-      </p:grpSpPr>
-      <p:sp>
-        <p:nvSpPr>
-          <p:cNvPr id="2" name="Title 1"/>
-          <p:cNvSpPr>
-            <a:spLocks noGrp="1"/>
-          </p:cNvSpPr>
-          <p:nvPr>
-            <p:ph type="title"/>
-          </p:nvPr>
-        </p:nvSpPr>
-        <p:spPr/>
-        <p:txBody>
-          <a:bodyPr/>
-          <a:lstStyle/>
-          <a:p>
-            <a:r>
-              <a:rPr lang="en-US" dirty="0" smtClean="0"/>
+              <a:rPr lang="en-US" dirty="0"/>
               <a:t>Exercise</a:t>
             </a:r>
-            <a:endParaRPr lang="en-US" dirty="0"/>
           </a:p>
         </p:txBody>
       </p:sp>
@@ -4443,79 +4777,51 @@
             </a:pPr>
             <a:r>
               <a:rPr lang="en-US" sz="2400" dirty="0"/>
-              <a:t>Create a class that represents contact information for a person.  The </a:t>
-            </a:r>
-            <a:r>
-              <a:rPr lang="en-US" sz="2400" dirty="0" smtClean="0"/>
-              <a:t>class should </a:t>
-            </a:r>
+              <a:t>Create a class that represents contact information for a person.  The class should store the person's name and their email address.  </a:t>
+            </a:r>
+          </a:p>
+          <a:p>
+            <a:pPr marL="0" indent="0">
+              <a:buNone/>
+            </a:pPr>
             <a:r>
               <a:rPr lang="en-US" sz="2400" dirty="0"/>
-              <a:t>store the person's name and their email address.  </a:t>
-            </a:r>
-            <a:endParaRPr lang="en-US" sz="2400" dirty="0" smtClean="0"/>
+              <a:t>Create a second class that represents an address book (a collection of contact information for many people) that includes methods for adding new contact information and for searching the existing collection for a contacts email address when the name is specified.</a:t>
+            </a:r>
           </a:p>
           <a:p>
             <a:pPr marL="0" indent="0">
               <a:buNone/>
             </a:pPr>
             <a:r>
-              <a:rPr lang="en-US" sz="2400" dirty="0" smtClean="0"/>
-              <a:t>Create </a:t>
-            </a:r>
-            <a:r>
               <a:rPr lang="en-US" sz="2400" dirty="0"/>
-              <a:t>a second class that represents an address book (a collection of </a:t>
-            </a:r>
-            <a:r>
-              <a:rPr lang="en-US" sz="2400" dirty="0" smtClean="0"/>
-              <a:t>contact information </a:t>
-            </a:r>
-            <a:r>
-              <a:rPr lang="en-US" sz="2400" dirty="0"/>
-              <a:t>for many people) that includes methods for adding new </a:t>
-            </a:r>
-            <a:r>
-              <a:rPr lang="en-US" sz="2400" dirty="0" smtClean="0"/>
-              <a:t>contact information </a:t>
-            </a:r>
-            <a:r>
-              <a:rPr lang="en-US" sz="2400" dirty="0"/>
-              <a:t>and for searching the existing collection for a contacts </a:t>
-            </a:r>
-            <a:r>
-              <a:rPr lang="en-US" sz="2400" dirty="0" smtClean="0"/>
-              <a:t>email address </a:t>
-            </a:r>
-            <a:r>
-              <a:rPr lang="en-US" sz="2400" dirty="0"/>
-              <a:t>when the name is specified</a:t>
-            </a:r>
-            <a:r>
-              <a:rPr lang="en-US" sz="2400" dirty="0" smtClean="0"/>
-              <a:t>.</a:t>
-            </a:r>
-          </a:p>
-          <a:p>
-            <a:pPr marL="0" indent="0">
-              <a:buNone/>
-            </a:pPr>
-            <a:r>
-              <a:rPr lang="en-US" sz="2400" dirty="0" smtClean="0"/>
-              <a:t>The </a:t>
-            </a:r>
-            <a:r>
-              <a:rPr lang="en-US" sz="2400" dirty="0"/>
-              <a:t>program should create instances of the classes and demonstrate </a:t>
-            </a:r>
-            <a:r>
-              <a:rPr lang="en-US" sz="2400" dirty="0" smtClean="0"/>
-              <a:t>the functionality</a:t>
-            </a:r>
-            <a:r>
-              <a:rPr lang="en-US" sz="2400" dirty="0"/>
-              <a:t>.</a:t>
-            </a:r>
+              <a:t>The program should create instances of the classes and demonstrate the functionality.</a:t>
+            </a:r>
+          </a:p>
+        </p:txBody>
+      </p:sp>
+      <p:sp>
+        <p:nvSpPr>
+          <p:cNvPr id="4" name="Slide Number Placeholder 3"/>
+          <p:cNvSpPr>
+            <a:spLocks noGrp="1"/>
+          </p:cNvSpPr>
+          <p:nvPr>
+            <p:ph type="sldNum" sz="quarter" idx="12"/>
+          </p:nvPr>
+        </p:nvSpPr>
+        <p:spPr/>
+        <p:txBody>
+          <a:bodyPr>
+            <a:normAutofit lnSpcReduction="10000"/>
+          </a:bodyPr>
+          <a:lstStyle/>
+          <a:p>
+            <a:fld id="{4FAB73BC-B049-4115-A692-8D63A059BFB8}" type="slidenum">
+              <a:rPr lang="en-US" smtClean="0"/>
+              <a:t>15</a:t>
+            </a:fld>
+            <a:endParaRPr lang="en-US" dirty="0"/>
           </a:p>
         </p:txBody>
       </p:sp>
@@ -4565,10 +4871,9 @@
           <a:lstStyle/>
           <a:p>
             <a:r>
-              <a:rPr lang="en-US" dirty="0" smtClean="0"/>
+              <a:rPr lang="en-US" dirty="0"/>
               <a:t>Corresponding Text</a:t>
             </a:r>
-            <a:endParaRPr lang="en-US" dirty="0"/>
           </a:p>
         </p:txBody>
       </p:sp>
@@ -4590,14 +4895,39 @@
           <a:lstStyle/>
           <a:p>
             <a:r>
-              <a:rPr lang="en-US" sz="2800" i="1" dirty="0" smtClean="0"/>
+              <a:rPr lang="en-US" sz="2800" i="1" dirty="0"/>
               <a:t>Learn Java for Android Development</a:t>
             </a:r>
             <a:r>
-              <a:rPr lang="en-US" sz="2800" dirty="0" smtClean="0"/>
+              <a:rPr lang="en-US" sz="2800" dirty="0"/>
               <a:t>, pp. 89-107, 124-137</a:t>
             </a:r>
             <a:endParaRPr lang="en-US" sz="2800" i="1" dirty="0"/>
+          </a:p>
+        </p:txBody>
+      </p:sp>
+      <p:sp>
+        <p:nvSpPr>
+          <p:cNvPr id="4" name="Slide Number Placeholder 3"/>
+          <p:cNvSpPr>
+            <a:spLocks noGrp="1"/>
+          </p:cNvSpPr>
+          <p:nvPr>
+            <p:ph type="sldNum" sz="quarter" idx="12"/>
+          </p:nvPr>
+        </p:nvSpPr>
+        <p:spPr/>
+        <p:txBody>
+          <a:bodyPr>
+            <a:normAutofit lnSpcReduction="10000"/>
+          </a:bodyPr>
+          <a:lstStyle/>
+          <a:p>
+            <a:fld id="{4FAB73BC-B049-4115-A692-8D63A059BFB8}" type="slidenum">
+              <a:rPr lang="en-US" smtClean="0"/>
+              <a:t>2</a:t>
+            </a:fld>
+            <a:endParaRPr lang="en-US" dirty="0"/>
           </a:p>
         </p:txBody>
       </p:sp>
@@ -4647,10 +4977,9 @@
           <a:lstStyle/>
           <a:p>
             <a:r>
-              <a:rPr lang="en-US" dirty="0" smtClean="0"/>
+              <a:rPr lang="en-US" dirty="0"/>
               <a:t>Classes and Objects</a:t>
             </a:r>
-            <a:endParaRPr lang="en-US" dirty="0"/>
           </a:p>
         </p:txBody>
       </p:sp>
@@ -4669,6 +4998,31 @@
           <a:bodyPr/>
           <a:lstStyle/>
           <a:p>
+            <a:endParaRPr lang="en-US" dirty="0"/>
+          </a:p>
+        </p:txBody>
+      </p:sp>
+      <p:sp>
+        <p:nvSpPr>
+          <p:cNvPr id="2" name="Slide Number Placeholder 1"/>
+          <p:cNvSpPr>
+            <a:spLocks noGrp="1"/>
+          </p:cNvSpPr>
+          <p:nvPr>
+            <p:ph type="sldNum" sz="quarter" idx="12"/>
+          </p:nvPr>
+        </p:nvSpPr>
+        <p:spPr/>
+        <p:txBody>
+          <a:bodyPr>
+            <a:normAutofit lnSpcReduction="10000"/>
+          </a:bodyPr>
+          <a:lstStyle/>
+          <a:p>
+            <a:fld id="{4FAB73BC-B049-4115-A692-8D63A059BFB8}" type="slidenum">
+              <a:rPr lang="en-US" smtClean="0"/>
+              <a:t>3</a:t>
+            </a:fld>
             <a:endParaRPr lang="en-US" dirty="0"/>
           </a:p>
         </p:txBody>
@@ -4719,10 +5073,9 @@
           <a:lstStyle/>
           <a:p>
             <a:r>
-              <a:rPr lang="en-US" dirty="0" smtClean="0"/>
+              <a:rPr lang="en-US" dirty="0"/>
               <a:t>Classes</a:t>
             </a:r>
-            <a:endParaRPr lang="en-US" dirty="0"/>
           </a:p>
         </p:txBody>
       </p:sp>
@@ -4744,33 +5097,33 @@
           <a:lstStyle/>
           <a:p>
             <a:r>
-              <a:rPr lang="en-US" sz="3200" dirty="0" smtClean="0"/>
+              <a:rPr lang="en-US" sz="3200" dirty="0"/>
               <a:t>Define structure of objects, define attributes and methods</a:t>
             </a:r>
           </a:p>
           <a:p>
             <a:r>
-              <a:rPr lang="en-US" sz="3200" dirty="0" smtClean="0"/>
+              <a:rPr lang="en-US" sz="3200" dirty="0"/>
               <a:t>Declared using reserved word </a:t>
             </a:r>
             <a:r>
-              <a:rPr lang="en-US" sz="3200" i="1" dirty="0" smtClean="0"/>
+              <a:rPr lang="en-US" sz="3200" i="1" dirty="0"/>
               <a:t>class</a:t>
             </a:r>
             <a:r>
-              <a:rPr lang="en-US" sz="3200" dirty="0" smtClean="0"/>
+              <a:rPr lang="en-US" sz="3200" dirty="0"/>
               <a:t> followed by a unique name</a:t>
             </a:r>
           </a:p>
           <a:p>
             <a:r>
-              <a:rPr lang="en-US" sz="3200" dirty="0" smtClean="0"/>
+              <a:rPr lang="en-US" sz="3200" dirty="0"/>
               <a:t>Usually, the first letter of every word in the name is capitalized</a:t>
             </a:r>
           </a:p>
           <a:p>
             <a:r>
-              <a:rPr lang="en-US" sz="3200" dirty="0" smtClean="0"/>
+              <a:rPr lang="en-US" sz="3200" dirty="0"/>
               <a:t>So far, all our code has been in Main</a:t>
             </a:r>
           </a:p>
@@ -4811,18 +5164,7 @@
                 <a:ea typeface="Consolas" charset="0"/>
                 <a:cs typeface="Consolas" charset="0"/>
               </a:rPr>
-              <a:t>class Name </a:t>
-            </a:r>
-            <a:r>
-              <a:rPr lang="en-US" dirty="0" smtClean="0">
-                <a:solidFill>
-                  <a:srgbClr val="FF0000"/>
-                </a:solidFill>
-                <a:latin typeface="Consolas" charset="0"/>
-                <a:ea typeface="Consolas" charset="0"/>
-                <a:cs typeface="Consolas" charset="0"/>
-              </a:rPr>
-              <a:t>{ </a:t>
+              <a:t>class Name { </a:t>
             </a:r>
           </a:p>
           <a:p>
@@ -4835,17 +5177,6 @@
               </a:spcAft>
               <a:buNone/>
             </a:pPr>
-            <a:r>
-              <a:rPr lang="en-US" dirty="0" smtClean="0">
-                <a:solidFill>
-                  <a:srgbClr val="FF0000"/>
-                </a:solidFill>
-                <a:latin typeface="Consolas" charset="0"/>
-                <a:ea typeface="Consolas" charset="0"/>
-                <a:cs typeface="Consolas" charset="0"/>
-              </a:rPr>
-              <a:t>    //</a:t>
-            </a:r>
             <a:r>
               <a:rPr lang="en-US" dirty="0">
                 <a:solidFill>
@@ -4855,18 +5186,7 @@
                 <a:ea typeface="Consolas" charset="0"/>
                 <a:cs typeface="Consolas" charset="0"/>
               </a:rPr>
-              <a:t>class member </a:t>
-            </a:r>
-            <a:r>
-              <a:rPr lang="en-US" dirty="0" smtClean="0">
-                <a:solidFill>
-                  <a:srgbClr val="FF0000"/>
-                </a:solidFill>
-                <a:latin typeface="Consolas" charset="0"/>
-                <a:ea typeface="Consolas" charset="0"/>
-                <a:cs typeface="Consolas" charset="0"/>
-              </a:rPr>
-              <a:t>declarations</a:t>
+              <a:t>    //class member declarations</a:t>
             </a:r>
           </a:p>
           <a:p>
@@ -4880,7 +5200,7 @@
               <a:buNone/>
             </a:pPr>
             <a:r>
-              <a:rPr lang="en-US" dirty="0" smtClean="0">
+              <a:rPr lang="en-US" dirty="0">
                 <a:solidFill>
                   <a:srgbClr val="FF0000"/>
                 </a:solidFill>
@@ -4890,14 +5210,31 @@
               </a:rPr>
               <a:t>}</a:t>
             </a:r>
-            <a:endParaRPr lang="en-US" dirty="0">
-              <a:solidFill>
-                <a:srgbClr val="FF0000"/>
-              </a:solidFill>
-              <a:latin typeface="Consolas" charset="0"/>
-              <a:ea typeface="Consolas" charset="0"/>
-              <a:cs typeface="Consolas" charset="0"/>
-            </a:endParaRPr>
+          </a:p>
+        </p:txBody>
+      </p:sp>
+      <p:sp>
+        <p:nvSpPr>
+          <p:cNvPr id="5" name="Slide Number Placeholder 4"/>
+          <p:cNvSpPr>
+            <a:spLocks noGrp="1"/>
+          </p:cNvSpPr>
+          <p:nvPr>
+            <p:ph type="sldNum" sz="quarter" idx="12"/>
+          </p:nvPr>
+        </p:nvSpPr>
+        <p:spPr/>
+        <p:txBody>
+          <a:bodyPr>
+            <a:normAutofit lnSpcReduction="10000"/>
+          </a:bodyPr>
+          <a:lstStyle/>
+          <a:p>
+            <a:fld id="{4FAB73BC-B049-4115-A692-8D63A059BFB8}" type="slidenum">
+              <a:rPr lang="en-US" smtClean="0"/>
+              <a:t>4</a:t>
+            </a:fld>
+            <a:endParaRPr lang="en-US" dirty="0"/>
           </a:p>
         </p:txBody>
       </p:sp>
@@ -4947,10 +5284,9 @@
           <a:lstStyle/>
           <a:p>
             <a:r>
-              <a:rPr lang="en-US" dirty="0" smtClean="0"/>
+              <a:rPr lang="en-US" dirty="0"/>
               <a:t>Creating Objects</a:t>
             </a:r>
-            <a:endParaRPr lang="en-US" dirty="0"/>
           </a:p>
         </p:txBody>
       </p:sp>
@@ -4972,81 +5308,105 @@
           <a:lstStyle/>
           <a:p>
             <a:r>
-              <a:rPr lang="en-US" sz="2000" dirty="0" smtClean="0"/>
+              <a:rPr lang="en-US" sz="2000" dirty="0"/>
               <a:t>Create objects (or instances) of a class using the </a:t>
             </a:r>
             <a:r>
-              <a:rPr lang="en-US" sz="2000" i="1" dirty="0" smtClean="0"/>
+              <a:rPr lang="en-US" sz="2000" i="1" dirty="0"/>
               <a:t>new</a:t>
             </a:r>
             <a:r>
-              <a:rPr lang="en-US" sz="2000" dirty="0" smtClean="0"/>
+              <a:rPr lang="en-US" sz="2000" dirty="0"/>
               <a:t> operator</a:t>
             </a:r>
           </a:p>
           <a:p>
             <a:r>
-              <a:rPr lang="en-US" sz="2000" dirty="0" smtClean="0"/>
+              <a:rPr lang="en-US" sz="2000" dirty="0"/>
               <a:t>We can use constructors to execute code when we create objects</a:t>
             </a:r>
           </a:p>
           <a:p>
             <a:r>
-              <a:rPr lang="en-US" sz="2000" dirty="0" smtClean="0"/>
+              <a:rPr lang="en-US" sz="2000" dirty="0"/>
               <a:t>A constructor is like a method but uses the class’s name</a:t>
             </a:r>
           </a:p>
           <a:p>
             <a:r>
-              <a:rPr lang="en-US" sz="2000" dirty="0" smtClean="0"/>
+              <a:rPr lang="en-US" sz="2000" dirty="0"/>
               <a:t>When the </a:t>
             </a:r>
             <a:r>
-              <a:rPr lang="en-US" sz="2000" i="1" dirty="0" smtClean="0"/>
+              <a:rPr lang="en-US" sz="2000" i="1" dirty="0"/>
               <a:t>new </a:t>
             </a:r>
             <a:r>
-              <a:rPr lang="en-US" sz="2000" dirty="0" smtClean="0"/>
+              <a:rPr lang="en-US" sz="2000" dirty="0"/>
               <a:t>operator is used:</a:t>
             </a:r>
           </a:p>
           <a:p>
             <a:pPr lvl="1"/>
             <a:r>
-              <a:rPr lang="en-US" sz="1800" dirty="0" smtClean="0"/>
+              <a:rPr lang="en-US" sz="1800" dirty="0"/>
               <a:t>constructor is used to allocate memory</a:t>
             </a:r>
           </a:p>
           <a:p>
             <a:pPr lvl="1"/>
             <a:r>
-              <a:rPr lang="en-US" sz="1800" dirty="0" smtClean="0"/>
+              <a:rPr lang="en-US" sz="1800" dirty="0"/>
               <a:t>the constructor’s code is executed</a:t>
             </a:r>
           </a:p>
           <a:p>
             <a:pPr lvl="1"/>
             <a:r>
-              <a:rPr lang="en-US" sz="1800" i="1" dirty="0" smtClean="0"/>
+              <a:rPr lang="en-US" sz="1800" i="1" dirty="0"/>
               <a:t>new </a:t>
             </a:r>
             <a:r>
-              <a:rPr lang="en-US" sz="1800" dirty="0" smtClean="0"/>
+              <a:rPr lang="en-US" sz="1800" dirty="0"/>
               <a:t>operator returns an instance of the class</a:t>
             </a:r>
           </a:p>
           <a:p>
             <a:r>
-              <a:rPr lang="en-US" sz="2000" dirty="0" smtClean="0"/>
+              <a:rPr lang="en-US" sz="2000" dirty="0"/>
               <a:t>A constructor can have a parameter list</a:t>
             </a:r>
           </a:p>
           <a:p>
             <a:r>
-              <a:rPr lang="en-US" sz="2000" dirty="0" smtClean="0"/>
+              <a:rPr lang="en-US" sz="2000" dirty="0"/>
               <a:t>If no constructor is specified, Java uses the default constructor</a:t>
             </a:r>
-            <a:endParaRPr lang="en-US" sz="2000" dirty="0"/>
+          </a:p>
+        </p:txBody>
+      </p:sp>
+      <p:sp>
+        <p:nvSpPr>
+          <p:cNvPr id="4" name="Slide Number Placeholder 3"/>
+          <p:cNvSpPr>
+            <a:spLocks noGrp="1"/>
+          </p:cNvSpPr>
+          <p:nvPr>
+            <p:ph type="sldNum" sz="quarter" idx="12"/>
+          </p:nvPr>
+        </p:nvSpPr>
+        <p:spPr/>
+        <p:txBody>
+          <a:bodyPr>
+            <a:normAutofit lnSpcReduction="10000"/>
+          </a:bodyPr>
+          <a:lstStyle/>
+          <a:p>
+            <a:fld id="{4FAB73BC-B049-4115-A692-8D63A059BFB8}" type="slidenum">
+              <a:rPr lang="en-US" smtClean="0"/>
+              <a:t>5</a:t>
+            </a:fld>
+            <a:endParaRPr lang="en-US" dirty="0"/>
           </a:p>
         </p:txBody>
       </p:sp>
@@ -5096,10 +5456,9 @@
           <a:lstStyle/>
           <a:p>
             <a:r>
-              <a:rPr lang="en-US" dirty="0" smtClean="0"/>
+              <a:rPr lang="en-US" dirty="0"/>
               <a:t>Encapsulation</a:t>
             </a:r>
-            <a:endParaRPr lang="en-US" dirty="0"/>
           </a:p>
         </p:txBody>
       </p:sp>
@@ -5121,16 +5480,40 @@
           <a:lstStyle/>
           <a:p>
             <a:r>
-              <a:rPr lang="en-US" sz="2800" dirty="0" smtClean="0"/>
+              <a:rPr lang="en-US" sz="2800" dirty="0"/>
               <a:t>Combining state information (fields) and related behaviors (methods) in one data structure</a:t>
             </a:r>
           </a:p>
           <a:p>
             <a:r>
-              <a:rPr lang="en-US" sz="2800" dirty="0" smtClean="0"/>
+              <a:rPr lang="en-US" sz="2800" dirty="0"/>
               <a:t>Sometimes used to describe restrictions on access to behaviors and state to avoid misuse or interference</a:t>
             </a:r>
-            <a:endParaRPr lang="en-US" sz="2800" dirty="0"/>
+          </a:p>
+        </p:txBody>
+      </p:sp>
+      <p:sp>
+        <p:nvSpPr>
+          <p:cNvPr id="4" name="Slide Number Placeholder 3"/>
+          <p:cNvSpPr>
+            <a:spLocks noGrp="1"/>
+          </p:cNvSpPr>
+          <p:nvPr>
+            <p:ph type="sldNum" sz="quarter" idx="12"/>
+          </p:nvPr>
+        </p:nvSpPr>
+        <p:spPr/>
+        <p:txBody>
+          <a:bodyPr>
+            <a:normAutofit lnSpcReduction="10000"/>
+          </a:bodyPr>
+          <a:lstStyle/>
+          <a:p>
+            <a:fld id="{4FAB73BC-B049-4115-A692-8D63A059BFB8}" type="slidenum">
+              <a:rPr lang="en-US" smtClean="0"/>
+              <a:t>6</a:t>
+            </a:fld>
+            <a:endParaRPr lang="en-US" dirty="0"/>
           </a:p>
         </p:txBody>
       </p:sp>
@@ -5180,10 +5563,9 @@
           <a:lstStyle/>
           <a:p>
             <a:r>
-              <a:rPr lang="en-US" dirty="0" smtClean="0"/>
+              <a:rPr lang="en-US" dirty="0"/>
               <a:t>Class Fields</a:t>
             </a:r>
-            <a:endParaRPr lang="en-US" dirty="0"/>
           </a:p>
         </p:txBody>
       </p:sp>
@@ -5210,38 +5592,37 @@
           <a:lstStyle/>
           <a:p>
             <a:r>
-              <a:rPr lang="en-US" sz="2000" dirty="0" smtClean="0"/>
+              <a:rPr lang="en-US" sz="2000" dirty="0"/>
               <a:t>Used to store an attribute associated with a class</a:t>
             </a:r>
           </a:p>
           <a:p>
             <a:r>
-              <a:rPr lang="en-US" sz="2000" dirty="0" smtClean="0"/>
+              <a:rPr lang="en-US" sz="2000" dirty="0"/>
               <a:t>Shared by all objects created by class</a:t>
             </a:r>
           </a:p>
           <a:p>
             <a:r>
-              <a:rPr lang="en-US" sz="2000" dirty="0" smtClean="0"/>
+              <a:rPr lang="en-US" sz="2000" dirty="0"/>
               <a:t>Specified using </a:t>
             </a:r>
             <a:r>
-              <a:rPr lang="en-US" sz="2000" i="1" dirty="0" smtClean="0"/>
+              <a:rPr lang="en-US" sz="2000" i="1" dirty="0"/>
               <a:t>static</a:t>
             </a:r>
           </a:p>
           <a:p>
             <a:r>
-              <a:rPr lang="en-US" sz="2000" dirty="0" smtClean="0"/>
+              <a:rPr lang="en-US" sz="2000" dirty="0"/>
               <a:t>If no initial value is specified, set to 0, 0.0, false, null, etc.</a:t>
             </a:r>
           </a:p>
           <a:p>
             <a:r>
-              <a:rPr lang="en-US" sz="2000" dirty="0" smtClean="0"/>
+              <a:rPr lang="en-US" sz="2000" dirty="0"/>
               <a:t>Can be accessed using class’s name</a:t>
             </a:r>
-            <a:endParaRPr lang="en-US" sz="2000" dirty="0"/>
           </a:p>
         </p:txBody>
       </p:sp>
@@ -5321,27 +5702,33 @@
                 <a:ea typeface="Consolas" charset="0"/>
                 <a:cs typeface="Consolas" charset="0"/>
               </a:rPr>
-              <a:t> </a:t>
-            </a:r>
-            <a:r>
-              <a:rPr lang="en-US" dirty="0" smtClean="0">
-                <a:solidFill>
-                  <a:srgbClr val="FF0000"/>
-                </a:solidFill>
-                <a:latin typeface="Consolas" charset="0"/>
-                <a:ea typeface="Consolas" charset="0"/>
-                <a:cs typeface="Consolas" charset="0"/>
-              </a:rPr>
-              <a:t>[= expression];</a:t>
-            </a:r>
-            <a:endParaRPr lang="en-US" dirty="0">
-              <a:solidFill>
-                <a:srgbClr val="FF0000"/>
-              </a:solidFill>
-              <a:latin typeface="Consolas" charset="0"/>
-              <a:ea typeface="Consolas" charset="0"/>
-              <a:cs typeface="Consolas" charset="0"/>
-            </a:endParaRPr>
+              <a:t> [= expression];</a:t>
+            </a:r>
+          </a:p>
+        </p:txBody>
+      </p:sp>
+      <p:sp>
+        <p:nvSpPr>
+          <p:cNvPr id="2" name="Slide Number Placeholder 1"/>
+          <p:cNvSpPr>
+            <a:spLocks noGrp="1"/>
+          </p:cNvSpPr>
+          <p:nvPr>
+            <p:ph type="sldNum" sz="quarter" idx="12"/>
+          </p:nvPr>
+        </p:nvSpPr>
+        <p:spPr/>
+        <p:txBody>
+          <a:bodyPr>
+            <a:normAutofit lnSpcReduction="10000"/>
+          </a:bodyPr>
+          <a:lstStyle/>
+          <a:p>
+            <a:fld id="{4FAB73BC-B049-4115-A692-8D63A059BFB8}" type="slidenum">
+              <a:rPr lang="en-US" smtClean="0"/>
+              <a:t>7</a:t>
+            </a:fld>
+            <a:endParaRPr lang="en-US" dirty="0"/>
           </a:p>
         </p:txBody>
       </p:sp>
@@ -5391,10 +5778,9 @@
           <a:lstStyle/>
           <a:p>
             <a:r>
-              <a:rPr lang="en-US" dirty="0" smtClean="0"/>
+              <a:rPr lang="en-US" dirty="0"/>
               <a:t>Instance Fields</a:t>
             </a:r>
-            <a:endParaRPr lang="en-US" dirty="0"/>
           </a:p>
         </p:txBody>
       </p:sp>
@@ -5421,28 +5807,27 @@
           <a:lstStyle/>
           <a:p>
             <a:r>
-              <a:rPr lang="en-US" sz="2000" dirty="0" smtClean="0"/>
+              <a:rPr lang="en-US" sz="2000" dirty="0"/>
               <a:t>Used to store an attribute associated with an object</a:t>
             </a:r>
           </a:p>
           <a:p>
             <a:r>
-              <a:rPr lang="en-US" sz="2000" dirty="0" smtClean="0"/>
+              <a:rPr lang="en-US" sz="2000" dirty="0"/>
               <a:t>Unique to the object</a:t>
             </a:r>
           </a:p>
           <a:p>
             <a:r>
-              <a:rPr lang="en-US" sz="2000" dirty="0" smtClean="0"/>
+              <a:rPr lang="en-US" sz="2000" dirty="0"/>
               <a:t>If no initial value is specified, set to 0, 0.0, false, null, etc.</a:t>
             </a:r>
           </a:p>
           <a:p>
             <a:r>
-              <a:rPr lang="en-US" sz="2000" dirty="0" smtClean="0"/>
+              <a:rPr lang="en-US" sz="2000" dirty="0"/>
               <a:t>Must be accessed using object’s name</a:t>
             </a:r>
-            <a:endParaRPr lang="en-US" sz="2000" dirty="0"/>
           </a:p>
         </p:txBody>
       </p:sp>
@@ -5470,7 +5855,7 @@
               <a:buNone/>
             </a:pPr>
             <a:r>
-              <a:rPr lang="en-US" dirty="0" err="1" smtClean="0">
+              <a:rPr lang="en-US" dirty="0" err="1">
                 <a:solidFill>
                   <a:srgbClr val="FF0000"/>
                 </a:solidFill>
@@ -5481,7 +5866,7 @@
               <a:t>type_name</a:t>
             </a:r>
             <a:r>
-              <a:rPr lang="en-US" dirty="0" smtClean="0">
+              <a:rPr lang="en-US" dirty="0">
                 <a:solidFill>
                   <a:srgbClr val="FF0000"/>
                 </a:solidFill>
@@ -5511,27 +5896,33 @@
                 <a:ea typeface="Consolas" charset="0"/>
                 <a:cs typeface="Consolas" charset="0"/>
               </a:rPr>
-              <a:t> </a:t>
-            </a:r>
-            <a:r>
-              <a:rPr lang="en-US" dirty="0" smtClean="0">
-                <a:solidFill>
-                  <a:srgbClr val="FF0000"/>
-                </a:solidFill>
-                <a:latin typeface="Consolas" charset="0"/>
-                <a:ea typeface="Consolas" charset="0"/>
-                <a:cs typeface="Consolas" charset="0"/>
-              </a:rPr>
-              <a:t>[= expression];</a:t>
-            </a:r>
-            <a:endParaRPr lang="en-US" dirty="0">
-              <a:solidFill>
-                <a:srgbClr val="FF0000"/>
-              </a:solidFill>
-              <a:latin typeface="Consolas" charset="0"/>
-              <a:ea typeface="Consolas" charset="0"/>
-              <a:cs typeface="Consolas" charset="0"/>
-            </a:endParaRPr>
+              <a:t> [= expression];</a:t>
+            </a:r>
+          </a:p>
+        </p:txBody>
+      </p:sp>
+      <p:sp>
+        <p:nvSpPr>
+          <p:cNvPr id="2" name="Slide Number Placeholder 1"/>
+          <p:cNvSpPr>
+            <a:spLocks noGrp="1"/>
+          </p:cNvSpPr>
+          <p:nvPr>
+            <p:ph type="sldNum" sz="quarter" idx="12"/>
+          </p:nvPr>
+        </p:nvSpPr>
+        <p:spPr/>
+        <p:txBody>
+          <a:bodyPr>
+            <a:normAutofit lnSpcReduction="10000"/>
+          </a:bodyPr>
+          <a:lstStyle/>
+          <a:p>
+            <a:fld id="{4FAB73BC-B049-4115-A692-8D63A059BFB8}" type="slidenum">
+              <a:rPr lang="en-US" smtClean="0"/>
+              <a:t>8</a:t>
+            </a:fld>
+            <a:endParaRPr lang="en-US" dirty="0"/>
           </a:p>
         </p:txBody>
       </p:sp>
@@ -5581,10 +5972,9 @@
           <a:lstStyle/>
           <a:p>
             <a:r>
-              <a:rPr lang="en-US" dirty="0" smtClean="0"/>
+              <a:rPr lang="en-US" dirty="0"/>
               <a:t>Class Methods</a:t>
             </a:r>
-            <a:endParaRPr lang="en-US" dirty="0"/>
           </a:p>
         </p:txBody>
       </p:sp>
@@ -5611,40 +6001,39 @@
           <a:lstStyle/>
           <a:p>
             <a:r>
-              <a:rPr lang="en-US" sz="2000" dirty="0" smtClean="0"/>
+              <a:rPr lang="en-US" sz="2000" dirty="0"/>
               <a:t>Used to represent behavior associated with a class</a:t>
             </a:r>
           </a:p>
           <a:p>
             <a:r>
-              <a:rPr lang="en-US" sz="2000" dirty="0" smtClean="0"/>
+              <a:rPr lang="en-US" sz="2000" dirty="0"/>
               <a:t>Specified using </a:t>
             </a:r>
             <a:r>
-              <a:rPr lang="en-US" sz="2000" i="1" dirty="0" smtClean="0"/>
+              <a:rPr lang="en-US" sz="2000" i="1" dirty="0"/>
               <a:t>static</a:t>
             </a:r>
-            <a:endParaRPr lang="en-US" sz="2000" dirty="0" smtClean="0"/>
-          </a:p>
-          <a:p>
-            <a:r>
-              <a:rPr lang="en-US" sz="2000" dirty="0" smtClean="0"/>
+            <a:endParaRPr lang="en-US" sz="2000" dirty="0"/>
+          </a:p>
+          <a:p>
+            <a:r>
+              <a:rPr lang="en-US" sz="2000" dirty="0"/>
               <a:t>Can be accessed using class’s name</a:t>
             </a:r>
           </a:p>
           <a:p>
             <a:r>
-              <a:rPr lang="en-US" sz="2000" dirty="0" smtClean="0"/>
+              <a:rPr lang="en-US" sz="2000" dirty="0"/>
               <a:t>Can access and modify class fields</a:t>
             </a:r>
-            <a:endParaRPr lang="en-US" sz="2000" i="1" dirty="0" smtClean="0"/>
-          </a:p>
-          <a:p>
-            <a:r>
-              <a:rPr lang="en-US" sz="2000" dirty="0" smtClean="0"/>
+            <a:endParaRPr lang="en-US" sz="2000" i="1" dirty="0"/>
+          </a:p>
+          <a:p>
+            <a:r>
+              <a:rPr lang="en-US" sz="2000" dirty="0"/>
               <a:t>Cannot access or modify instance fields</a:t>
             </a:r>
-            <a:endParaRPr lang="en-US" sz="2000" dirty="0"/>
           </a:p>
         </p:txBody>
       </p:sp>
@@ -5730,18 +6119,7 @@
                 <a:ea typeface="Consolas" charset="0"/>
                 <a:cs typeface="Consolas" charset="0"/>
               </a:rPr>
-              <a:t>) </a:t>
-            </a:r>
-            <a:r>
-              <a:rPr lang="en-US" dirty="0" smtClean="0">
-                <a:solidFill>
-                  <a:srgbClr val="FF0000"/>
-                </a:solidFill>
-                <a:latin typeface="Consolas" charset="0"/>
-                <a:ea typeface="Consolas" charset="0"/>
-                <a:cs typeface="Consolas" charset="0"/>
-              </a:rPr>
-              <a:t>{</a:t>
+              <a:t>) {</a:t>
             </a:r>
           </a:p>
           <a:p>
@@ -5754,17 +6132,6 @@
               </a:spcAft>
               <a:buNone/>
             </a:pPr>
-            <a:r>
-              <a:rPr lang="en-US" dirty="0" smtClean="0">
-                <a:solidFill>
-                  <a:srgbClr val="FF0000"/>
-                </a:solidFill>
-                <a:latin typeface="Consolas" charset="0"/>
-                <a:ea typeface="Consolas" charset="0"/>
-                <a:cs typeface="Consolas" charset="0"/>
-              </a:rPr>
-              <a:t>    //</a:t>
-            </a:r>
             <a:r>
               <a:rPr lang="en-US" dirty="0">
                 <a:solidFill>
@@ -5774,18 +6141,7 @@
                 <a:ea typeface="Consolas" charset="0"/>
                 <a:cs typeface="Consolas" charset="0"/>
               </a:rPr>
-              <a:t>statements to </a:t>
-            </a:r>
-            <a:r>
-              <a:rPr lang="en-US" dirty="0" smtClean="0">
-                <a:solidFill>
-                  <a:srgbClr val="FF0000"/>
-                </a:solidFill>
-                <a:latin typeface="Consolas" charset="0"/>
-                <a:ea typeface="Consolas" charset="0"/>
-                <a:cs typeface="Consolas" charset="0"/>
-              </a:rPr>
-              <a:t>execute</a:t>
+              <a:t>    //statements to execute</a:t>
             </a:r>
           </a:p>
           <a:p>
@@ -5799,7 +6155,7 @@
               <a:buNone/>
             </a:pPr>
             <a:r>
-              <a:rPr lang="en-US" dirty="0" smtClean="0">
+              <a:rPr lang="en-US" dirty="0">
                 <a:solidFill>
                   <a:srgbClr val="FF0000"/>
                 </a:solidFill>
@@ -5809,14 +6165,31 @@
               </a:rPr>
               <a:t>}</a:t>
             </a:r>
-            <a:endParaRPr lang="en-US" dirty="0">
-              <a:solidFill>
-                <a:srgbClr val="FF0000"/>
-              </a:solidFill>
-              <a:latin typeface="Consolas" charset="0"/>
-              <a:ea typeface="Consolas" charset="0"/>
-              <a:cs typeface="Consolas" charset="0"/>
-            </a:endParaRPr>
+          </a:p>
+        </p:txBody>
+      </p:sp>
+      <p:sp>
+        <p:nvSpPr>
+          <p:cNvPr id="2" name="Slide Number Placeholder 1"/>
+          <p:cNvSpPr>
+            <a:spLocks noGrp="1"/>
+          </p:cNvSpPr>
+          <p:nvPr>
+            <p:ph type="sldNum" sz="quarter" idx="12"/>
+          </p:nvPr>
+        </p:nvSpPr>
+        <p:spPr/>
+        <p:txBody>
+          <a:bodyPr>
+            <a:normAutofit lnSpcReduction="10000"/>
+          </a:bodyPr>
+          <a:lstStyle/>
+          <a:p>
+            <a:fld id="{4FAB73BC-B049-4115-A692-8D63A059BFB8}" type="slidenum">
+              <a:rPr lang="en-US" smtClean="0"/>
+              <a:t>9</a:t>
+            </a:fld>
+            <a:endParaRPr lang="en-US" dirty="0"/>
           </a:p>
         </p:txBody>
       </p:sp>
@@ -6084,4 +6457,299 @@
     </a:ext>
   </a:extLst>
 </a:theme>
+</file>
+
+<file path=ppt/theme/theme2.xml><?xml version="1.0" encoding="utf-8"?>
+<a:theme xmlns:a="http://schemas.openxmlformats.org/drawingml/2006/main" name="Office Theme">
+  <a:themeElements>
+    <a:clrScheme name="Office">
+      <a:dk1>
+        <a:sysClr val="windowText" lastClr="000000"/>
+      </a:dk1>
+      <a:lt1>
+        <a:sysClr val="window" lastClr="FFFFFF"/>
+      </a:lt1>
+      <a:dk2>
+        <a:srgbClr val="44546A"/>
+      </a:dk2>
+      <a:lt2>
+        <a:srgbClr val="E7E6E6"/>
+      </a:lt2>
+      <a:accent1>
+        <a:srgbClr val="5B9BD5"/>
+      </a:accent1>
+      <a:accent2>
+        <a:srgbClr val="ED7D31"/>
+      </a:accent2>
+      <a:accent3>
+        <a:srgbClr val="A5A5A5"/>
+      </a:accent3>
+      <a:accent4>
+        <a:srgbClr val="FFC000"/>
+      </a:accent4>
+      <a:accent5>
+        <a:srgbClr val="4472C4"/>
+      </a:accent5>
+      <a:accent6>
+        <a:srgbClr val="70AD47"/>
+      </a:accent6>
+      <a:hlink>
+        <a:srgbClr val="0563C1"/>
+      </a:hlink>
+      <a:folHlink>
+        <a:srgbClr val="954F72"/>
+      </a:folHlink>
+    </a:clrScheme>
+    <a:fontScheme name="Office">
+      <a:majorFont>
+        <a:latin typeface="Calibri Light" panose="020F0302020204030204"/>
+        <a:ea typeface=""/>
+        <a:cs typeface=""/>
+        <a:font script="Jpan" typeface="游ゴシック Light"/>
+        <a:font script="Hang" typeface="맑은 고딕"/>
+        <a:font script="Hans" typeface="等线 Light"/>
+        <a:font script="Hant" typeface="新細明體"/>
+        <a:font script="Arab" typeface="Times New Roman"/>
+        <a:font script="Hebr" typeface="Times New Roman"/>
+        <a:font script="Thai" typeface="Angsana New"/>
+        <a:font script="Ethi" typeface="Nyala"/>
+        <a:font script="Beng" typeface="Vrinda"/>
+        <a:font script="Gujr" typeface="Shruti"/>
+        <a:font script="Khmr" typeface="MoolBoran"/>
+        <a:font script="Knda" typeface="Tunga"/>
+        <a:font script="Guru" typeface="Raavi"/>
+        <a:font script="Cans" typeface="Euphemia"/>
+        <a:font script="Cher" typeface="Plantagenet Cherokee"/>
+        <a:font script="Yiii" typeface="Microsoft Yi Baiti"/>
+        <a:font script="Tibt" typeface="Microsoft Himalaya"/>
+        <a:font script="Thaa" typeface="MV Boli"/>
+        <a:font script="Deva" typeface="Mangal"/>
+        <a:font script="Telu" typeface="Gautami"/>
+        <a:font script="Taml" typeface="Latha"/>
+        <a:font script="Syrc" typeface="Estrangelo Edessa"/>
+        <a:font script="Orya" typeface="Kalinga"/>
+        <a:font script="Mlym" typeface="Kartika"/>
+        <a:font script="Laoo" typeface="DokChampa"/>
+        <a:font script="Sinh" typeface="Iskoola Pota"/>
+        <a:font script="Mong" typeface="Mongolian Baiti"/>
+        <a:font script="Viet" typeface="Times New Roman"/>
+        <a:font script="Uigh" typeface="Microsoft Uighur"/>
+        <a:font script="Geor" typeface="Sylfaen"/>
+        <a:font script="Armn" typeface="Arial"/>
+        <a:font script="Bugi" typeface="Leelawadee UI"/>
+        <a:font script="Bopo" typeface="Microsoft JhengHei"/>
+        <a:font script="Java" typeface="Javanese Text"/>
+        <a:font script="Lisu" typeface="Segoe UI"/>
+        <a:font script="Mymr" typeface="Myanmar Text"/>
+        <a:font script="Nkoo" typeface="Ebrima"/>
+        <a:font script="Olck" typeface="Nirmala UI"/>
+        <a:font script="Osma" typeface="Ebrima"/>
+        <a:font script="Phag" typeface="Phagspa"/>
+        <a:font script="Syrn" typeface="Estrangelo Edessa"/>
+        <a:font script="Syrj" typeface="Estrangelo Edessa"/>
+        <a:font script="Syre" typeface="Estrangelo Edessa"/>
+        <a:font script="Sora" typeface="Nirmala UI"/>
+        <a:font script="Tale" typeface="Microsoft Tai Le"/>
+        <a:font script="Talu" typeface="Microsoft New Tai Lue"/>
+        <a:font script="Tfng" typeface="Ebrima"/>
+      </a:majorFont>
+      <a:minorFont>
+        <a:latin typeface="Calibri" panose="020F0502020204030204"/>
+        <a:ea typeface=""/>
+        <a:cs typeface=""/>
+        <a:font script="Jpan" typeface="游ゴシック"/>
+        <a:font script="Hang" typeface="맑은 고딕"/>
+        <a:font script="Hans" typeface="等线"/>
+        <a:font script="Hant" typeface="新細明體"/>
+        <a:font script="Arab" typeface="Arial"/>
+        <a:font script="Hebr" typeface="Arial"/>
+        <a:font script="Thai" typeface="Cordia New"/>
+        <a:font script="Ethi" typeface="Nyala"/>
+        <a:font script="Beng" typeface="Vrinda"/>
+        <a:font script="Gujr" typeface="Shruti"/>
+        <a:font script="Khmr" typeface="DaunPenh"/>
+        <a:font script="Knda" typeface="Tunga"/>
+        <a:font script="Guru" typeface="Raavi"/>
+        <a:font script="Cans" typeface="Euphemia"/>
+        <a:font script="Cher" typeface="Plantagenet Cherokee"/>
+        <a:font script="Yiii" typeface="Microsoft Yi Baiti"/>
+        <a:font script="Tibt" typeface="Microsoft Himalaya"/>
+        <a:font script="Thaa" typeface="MV Boli"/>
+        <a:font script="Deva" typeface="Mangal"/>
+        <a:font script="Telu" typeface="Gautami"/>
+        <a:font script="Taml" typeface="Latha"/>
+        <a:font script="Syrc" typeface="Estrangelo Edessa"/>
+        <a:font script="Orya" typeface="Kalinga"/>
+        <a:font script="Mlym" typeface="Kartika"/>
+        <a:font script="Laoo" typeface="DokChampa"/>
+        <a:font script="Sinh" typeface="Iskoola Pota"/>
+        <a:font script="Mong" typeface="Mongolian Baiti"/>
+        <a:font script="Viet" typeface="Arial"/>
+        <a:font script="Uigh" typeface="Microsoft Uighur"/>
+        <a:font script="Geor" typeface="Sylfaen"/>
+        <a:font script="Armn" typeface="Arial"/>
+        <a:font script="Bugi" typeface="Leelawadee UI"/>
+        <a:font script="Bopo" typeface="Microsoft JhengHei"/>
+        <a:font script="Java" typeface="Javanese Text"/>
+        <a:font script="Lisu" typeface="Segoe UI"/>
+        <a:font script="Mymr" typeface="Myanmar Text"/>
+        <a:font script="Nkoo" typeface="Ebrima"/>
+        <a:font script="Olck" typeface="Nirmala UI"/>
+        <a:font script="Osma" typeface="Ebrima"/>
+        <a:font script="Phag" typeface="Phagspa"/>
+        <a:font script="Syrn" typeface="Estrangelo Edessa"/>
+        <a:font script="Syrj" typeface="Estrangelo Edessa"/>
+        <a:font script="Syre" typeface="Estrangelo Edessa"/>
+        <a:font script="Sora" typeface="Nirmala UI"/>
+        <a:font script="Tale" typeface="Microsoft Tai Le"/>
+        <a:font script="Talu" typeface="Microsoft New Tai Lue"/>
+        <a:font script="Tfng" typeface="Ebrima"/>
+      </a:minorFont>
+    </a:fontScheme>
+    <a:fmtScheme name="Office">
+      <a:fillStyleLst>
+        <a:solidFill>
+          <a:schemeClr val="phClr"/>
+        </a:solidFill>
+        <a:gradFill rotWithShape="1">
+          <a:gsLst>
+            <a:gs pos="0">
+              <a:schemeClr val="phClr">
+                <a:lumMod val="110000"/>
+                <a:satMod val="105000"/>
+                <a:tint val="67000"/>
+              </a:schemeClr>
+            </a:gs>
+            <a:gs pos="50000">
+              <a:schemeClr val="phClr">
+                <a:lumMod val="105000"/>
+                <a:satMod val="103000"/>
+                <a:tint val="73000"/>
+              </a:schemeClr>
+            </a:gs>
+            <a:gs pos="100000">
+              <a:schemeClr val="phClr">
+                <a:lumMod val="105000"/>
+                <a:satMod val="109000"/>
+                <a:tint val="81000"/>
+              </a:schemeClr>
+            </a:gs>
+          </a:gsLst>
+          <a:lin ang="5400000" scaled="0"/>
+        </a:gradFill>
+        <a:gradFill rotWithShape="1">
+          <a:gsLst>
+            <a:gs pos="0">
+              <a:schemeClr val="phClr">
+                <a:satMod val="103000"/>
+                <a:lumMod val="102000"/>
+                <a:tint val="94000"/>
+              </a:schemeClr>
+            </a:gs>
+            <a:gs pos="50000">
+              <a:schemeClr val="phClr">
+                <a:satMod val="110000"/>
+                <a:lumMod val="100000"/>
+                <a:shade val="100000"/>
+              </a:schemeClr>
+            </a:gs>
+            <a:gs pos="100000">
+              <a:schemeClr val="phClr">
+                <a:lumMod val="99000"/>
+                <a:satMod val="120000"/>
+                <a:shade val="78000"/>
+              </a:schemeClr>
+            </a:gs>
+          </a:gsLst>
+          <a:lin ang="5400000" scaled="0"/>
+        </a:gradFill>
+      </a:fillStyleLst>
+      <a:lnStyleLst>
+        <a:ln w="6350" cap="flat" cmpd="sng" algn="ctr">
+          <a:solidFill>
+            <a:schemeClr val="phClr"/>
+          </a:solidFill>
+          <a:prstDash val="solid"/>
+          <a:miter lim="800000"/>
+        </a:ln>
+        <a:ln w="12700" cap="flat" cmpd="sng" algn="ctr">
+          <a:solidFill>
+            <a:schemeClr val="phClr"/>
+          </a:solidFill>
+          <a:prstDash val="solid"/>
+          <a:miter lim="800000"/>
+        </a:ln>
+        <a:ln w="19050" cap="flat" cmpd="sng" algn="ctr">
+          <a:solidFill>
+            <a:schemeClr val="phClr"/>
+          </a:solidFill>
+          <a:prstDash val="solid"/>
+          <a:miter lim="800000"/>
+        </a:ln>
+      </a:lnStyleLst>
+      <a:effectStyleLst>
+        <a:effectStyle>
+          <a:effectLst/>
+        </a:effectStyle>
+        <a:effectStyle>
+          <a:effectLst/>
+        </a:effectStyle>
+        <a:effectStyle>
+          <a:effectLst>
+            <a:outerShdw blurRad="57150" dist="19050" dir="5400000" algn="ctr" rotWithShape="0">
+              <a:srgbClr val="000000">
+                <a:alpha val="63000"/>
+              </a:srgbClr>
+            </a:outerShdw>
+          </a:effectLst>
+        </a:effectStyle>
+      </a:effectStyleLst>
+      <a:bgFillStyleLst>
+        <a:solidFill>
+          <a:schemeClr val="phClr"/>
+        </a:solidFill>
+        <a:solidFill>
+          <a:schemeClr val="phClr">
+            <a:tint val="95000"/>
+            <a:satMod val="170000"/>
+          </a:schemeClr>
+        </a:solidFill>
+        <a:gradFill rotWithShape="1">
+          <a:gsLst>
+            <a:gs pos="0">
+              <a:schemeClr val="phClr">
+                <a:tint val="93000"/>
+                <a:satMod val="150000"/>
+                <a:shade val="98000"/>
+                <a:lumMod val="102000"/>
+              </a:schemeClr>
+            </a:gs>
+            <a:gs pos="50000">
+              <a:schemeClr val="phClr">
+                <a:tint val="98000"/>
+                <a:satMod val="130000"/>
+                <a:shade val="90000"/>
+                <a:lumMod val="103000"/>
+              </a:schemeClr>
+            </a:gs>
+            <a:gs pos="100000">
+              <a:schemeClr val="phClr">
+                <a:shade val="63000"/>
+                <a:satMod val="120000"/>
+              </a:schemeClr>
+            </a:gs>
+          </a:gsLst>
+          <a:lin ang="5400000" scaled="0"/>
+        </a:gradFill>
+      </a:bgFillStyleLst>
+    </a:fmtScheme>
+  </a:themeElements>
+  <a:objectDefaults/>
+  <a:extraClrSchemeLst/>
+  <a:extLst>
+    <a:ext uri="{05A4C25C-085E-4340-85A3-A5531E510DB2}">
+      <thm15:themeFamily xmlns:thm15="http://schemas.microsoft.com/office/thememl/2012/main" name="Office Theme" id="{62F939B6-93AF-4DB8-9C6B-D6C7DFDC589F}" vid="{4A3C46E8-61CC-4603-A589-7422A47A8E4A}"/>
+    </a:ext>
+  </a:extLst>
+</a:theme>
 </file>
</xml_diff>

<commit_message>
week 5,6: fix typos
</commit_message>
<xml_diff>
--- a/week_05/week_05.pptx
+++ b/week_05/week_05.pptx
@@ -211,7 +211,7 @@
           <a:p>
             <a:fld id="{D098A69A-8C0A-417B-A4F9-F3F8CFDA4B25}" type="datetimeFigureOut">
               <a:rPr lang="en-US" smtClean="0"/>
-              <a:t>9/26/2016</a:t>
+              <a:t>2/20/17</a:t>
             </a:fld>
             <a:endParaRPr lang="en-US"/>
           </a:p>
@@ -646,7 +646,7 @@
           <a:p>
             <a:fld id="{C5022D4C-ECF1-4363-AE2D-FF2CC7668413}" type="datetime1">
               <a:rPr lang="en-US" smtClean="0"/>
-              <a:t>9/26/2016</a:t>
+              <a:t>2/20/17</a:t>
             </a:fld>
             <a:endParaRPr lang="en-US" dirty="0"/>
           </a:p>
@@ -870,7 +870,7 @@
           <a:p>
             <a:fld id="{FD466F08-1A84-4361-A42C-F8F461839910}" type="datetime1">
               <a:rPr lang="en-US" smtClean="0"/>
-              <a:t>9/26/2016</a:t>
+              <a:t>2/20/17</a:t>
             </a:fld>
             <a:endParaRPr lang="en-US" dirty="0"/>
           </a:p>
@@ -1045,7 +1045,7 @@
           <a:p>
             <a:fld id="{164C6F1A-3BA3-49D0-8A1C-AC2B4AEA557B}" type="datetime1">
               <a:rPr lang="en-US" smtClean="0"/>
-              <a:t>9/26/2016</a:t>
+              <a:t>2/20/17</a:t>
             </a:fld>
             <a:endParaRPr lang="en-US" dirty="0"/>
           </a:p>
@@ -1210,7 +1210,7 @@
           <a:p>
             <a:fld id="{7AA2696C-B353-4BBB-A6A0-AB25442AAAE1}" type="datetime1">
               <a:rPr lang="en-US" smtClean="0"/>
-              <a:t>9/26/2016</a:t>
+              <a:t>2/20/17</a:t>
             </a:fld>
             <a:endParaRPr lang="en-US" dirty="0"/>
           </a:p>
@@ -1459,7 +1459,7 @@
           <a:p>
             <a:fld id="{99432F98-8A0E-4C24-BA2E-F43AE2A86A09}" type="datetime1">
               <a:rPr lang="en-US" smtClean="0"/>
-              <a:t>9/26/2016</a:t>
+              <a:t>2/20/17</a:t>
             </a:fld>
             <a:endParaRPr lang="en-US" dirty="0"/>
           </a:p>
@@ -1780,7 +1780,7 @@
           <a:p>
             <a:fld id="{51AD969A-3282-4DE3-A49A-3577742392B4}" type="datetime1">
               <a:rPr lang="en-US" smtClean="0"/>
-              <a:t>9/26/2016</a:t>
+              <a:t>2/20/17</a:t>
             </a:fld>
             <a:endParaRPr lang="en-US" dirty="0"/>
           </a:p>
@@ -2226,7 +2226,7 @@
           <a:p>
             <a:fld id="{42E9E36B-4DF7-43C2-B556-32C42230C987}" type="datetime1">
               <a:rPr lang="en-US" smtClean="0"/>
-              <a:t>9/26/2016</a:t>
+              <a:t>2/20/17</a:t>
             </a:fld>
             <a:endParaRPr lang="en-US" dirty="0"/>
           </a:p>
@@ -2339,7 +2339,7 @@
           <a:p>
             <a:fld id="{4CE393FA-0177-460E-B4A5-32DD96140989}" type="datetime1">
               <a:rPr lang="en-US" smtClean="0"/>
-              <a:t>9/26/2016</a:t>
+              <a:t>2/20/17</a:t>
             </a:fld>
             <a:endParaRPr lang="en-US" dirty="0"/>
           </a:p>
@@ -2429,7 +2429,7 @@
           <a:p>
             <a:fld id="{1F8BFF0D-957F-4F17-9E71-C5D809095116}" type="datetime1">
               <a:rPr lang="en-US" smtClean="0"/>
-              <a:t>9/26/2016</a:t>
+              <a:t>2/20/17</a:t>
             </a:fld>
             <a:endParaRPr lang="en-US" dirty="0"/>
           </a:p>
@@ -2711,7 +2711,7 @@
           <a:p>
             <a:fld id="{6B53CED7-DF84-4CDE-8390-1F5C7849A4ED}" type="datetime1">
               <a:rPr lang="en-US" smtClean="0"/>
-              <a:t>9/26/2016</a:t>
+              <a:t>2/20/17</a:t>
             </a:fld>
             <a:endParaRPr lang="en-US" dirty="0"/>
           </a:p>
@@ -3031,7 +3031,7 @@
           <a:p>
             <a:fld id="{B4AAC8C1-99F0-4EDD-B8E8-5D2C4F7CA4DB}" type="datetime1">
               <a:rPr lang="en-US" smtClean="0"/>
-              <a:t>9/26/2016</a:t>
+              <a:t>2/20/17</a:t>
             </a:fld>
             <a:endParaRPr lang="en-US" dirty="0"/>
           </a:p>
@@ -3280,7 +3280,7 @@
           <a:p>
             <a:fld id="{C2818F2D-763D-4540-AB1C-E1563353FA80}" type="datetime1">
               <a:rPr lang="en-US" smtClean="0"/>
-              <a:t>9/26/2016</a:t>
+              <a:t>2/20/17</a:t>
             </a:fld>
             <a:endParaRPr lang="en-US" dirty="0"/>
           </a:p>
@@ -4653,7 +4653,21 @@
                 <a:ea typeface="Consolas" charset="0"/>
                 <a:cs typeface="Consolas" charset="0"/>
               </a:rPr>
-              <a:t> is an object that cannot be access from anywhere else in the program</a:t>
+              <a:t> is an object that cannot be </a:t>
+            </a:r>
+            <a:r>
+              <a:rPr lang="en-US" sz="2400" dirty="0" smtClean="0">
+                <a:ea typeface="Consolas" charset="0"/>
+                <a:cs typeface="Consolas" charset="0"/>
+              </a:rPr>
+              <a:t>accessed </a:t>
+            </a:r>
+            <a:r>
+              <a:rPr lang="en-US" sz="2400" dirty="0">
+                <a:ea typeface="Consolas" charset="0"/>
+                <a:cs typeface="Consolas" charset="0"/>
+              </a:rPr>
+              <a:t>from anywhere else in the program</a:t>
             </a:r>
           </a:p>
           <a:p>

</xml_diff>